<commit_message>
Update Learning Systems PPT
</commit_message>
<xml_diff>
--- a/AI Learning Systems.pptx
+++ b/AI Learning Systems.pptx
@@ -144,6 +144,14 @@
 </p:presentation>
 </file>
 
+<file path=ppt/revisionInfo.xml><?xml version="1.0" encoding="utf-8"?>
+<p1510:revInfo xmlns:a="http://schemas.openxmlformats.org/drawingml/2006/main" xmlns:r="http://schemas.openxmlformats.org/officeDocument/2006/relationships" xmlns:p1510="http://schemas.microsoft.com/office/powerpoint/2015/10/main">
+  <p1510:revLst>
+    <p1510:client id="{1153E156-F2EA-46F5-9771-A633B9837E64}" v="1" dt="2024-12-28T20:40:52.389"/>
+  </p1510:revLst>
+</p1510:revInfo>
+</file>
+
 <file path=ppt/changesInfos/changesInfo1.xml><?xml version="1.0" encoding="utf-8"?>
 <pc:chgInfo xmlns:a="http://schemas.openxmlformats.org/drawingml/2006/main" xmlns:r="http://schemas.openxmlformats.org/officeDocument/2006/relationships" xmlns:ac="http://schemas.microsoft.com/office/drawing/2013/main/command" xmlns:pc="http://schemas.microsoft.com/office/powerpoint/2013/main/command">
   <pc:docChgLst>
@@ -1484,7 +1492,7 @@
   <pc:docChgLst>
     <pc:chgData name="Myers, Chelsea" userId="f282533b-c263-466c-86f9-3d67bd04ab31" providerId="ADAL" clId="{1153E156-F2EA-46F5-9771-A633B9837E64}"/>
     <pc:docChg chg="modSld">
-      <pc:chgData name="Myers, Chelsea" userId="f282533b-c263-466c-86f9-3d67bd04ab31" providerId="ADAL" clId="{1153E156-F2EA-46F5-9771-A633B9837E64}" dt="2024-12-25T23:35:30.668" v="0"/>
+      <pc:chgData name="Myers, Chelsea" userId="f282533b-c263-466c-86f9-3d67bd04ab31" providerId="ADAL" clId="{1153E156-F2EA-46F5-9771-A633B9837E64}" dt="2024-12-28T20:43:16.402" v="55"/>
       <pc:docMkLst>
         <pc:docMk/>
       </pc:docMkLst>
@@ -1493,6 +1501,20 @@
         <pc:sldMkLst>
           <pc:docMk/>
           <pc:sldMk cId="0" sldId="268"/>
+        </pc:sldMkLst>
+      </pc:sldChg>
+      <pc:sldChg chg="modNotesTx">
+        <pc:chgData name="Myers, Chelsea" userId="f282533b-c263-466c-86f9-3d67bd04ab31" providerId="ADAL" clId="{1153E156-F2EA-46F5-9771-A633B9837E64}" dt="2024-12-28T20:42:08.967" v="50"/>
+        <pc:sldMkLst>
+          <pc:docMk/>
+          <pc:sldMk cId="0" sldId="272"/>
+        </pc:sldMkLst>
+      </pc:sldChg>
+      <pc:sldChg chg="modNotesTx">
+        <pc:chgData name="Myers, Chelsea" userId="f282533b-c263-466c-86f9-3d67bd04ab31" providerId="ADAL" clId="{1153E156-F2EA-46F5-9771-A633B9837E64}" dt="2024-12-28T20:43:16.402" v="55"/>
+        <pc:sldMkLst>
+          <pc:docMk/>
+          <pc:sldMk cId="2797580797" sldId="277"/>
         </pc:sldMkLst>
       </pc:sldChg>
     </pc:docChg>
@@ -1606,7 +1628,7 @@
           <a:p>
             <a:fld id="{CC9680B7-A211-431D-B6B2-815D19B7BD70}" type="datetimeFigureOut">
               <a:rPr lang="en-US" smtClean="0"/>
-              <a:t>12/25/2024</a:t>
+              <a:t>12/27/2024</a:t>
             </a:fld>
             <a:endParaRPr lang="en-US"/>
           </a:p>
@@ -1997,8 +2019,57 @@
               <a:buChar char="•"/>
             </a:pPr>
             <a:r>
+              <a:rPr lang="en-US" b="1" dirty="0"/>
+              <a:t>Support Vector Machines (SVMs)</a:t>
+            </a:r>
+            <a:r>
               <a:rPr lang="en-US" dirty="0"/>
-              <a:t>Support Vector Machines (SVMs) became popular for their effectiveness in classification and regression tasks, especially in high-dimensional spaces. Recurrent Neural Networks (RNNs) were crucial for sequence data processing – information can pass between layers in two directions rather than just forward -  but they struggled with the vanishing gradient problem, which was later addressed by Long Short-Term Memory (LSTM) networks. Deep Belief Networks (DBNs), introduced by Geoffrey Hinton, allowed for the layer-wise pre-training of deep networks, making it possible to train deeper models effectively.  In the vanishing gradient problem, it becomes more difficult train layers closer to the input because the gradient becomes so small that it “disappears” by the time you work all the way back that far.  </a:t>
+              <a:t>: SVMs worked by finding the optimal hyperplane that separated classes in high-dimensional space, making them effective for tasks like image classification and text categorization.</a:t>
+            </a:r>
+          </a:p>
+          <a:p>
+            <a:pPr>
+              <a:buFont typeface="Arial" panose="020B0604020202020204" pitchFamily="34" charset="0"/>
+              <a:buNone/>
+            </a:pPr>
+            <a:endParaRPr lang="en-US" dirty="0"/>
+          </a:p>
+          <a:p>
+            <a:pPr>
+              <a:buFont typeface="Arial" panose="020B0604020202020204" pitchFamily="34" charset="0"/>
+              <a:buNone/>
+            </a:pPr>
+            <a:r>
+              <a:rPr lang="en-US" b="1" dirty="0"/>
+              <a:t>How SVMs Work</a:t>
+            </a:r>
+            <a:r>
+              <a:rPr lang="en-US" dirty="0"/>
+              <a:t>: SVMs are supervised learning models that classify data by finding the hyperplane that best separates data points in high-dimensional space. For example, imagine a graph where data points belonging to two classes are separated by a line. The SVM identifies the line (or hyperplane) that maximizes the margin between the two </a:t>
+            </a:r>
+            <a:r>
+              <a:rPr lang="en-US" dirty="0" err="1"/>
+              <a:t>classes.</a:t>
+            </a:r>
+            <a:r>
+              <a:rPr lang="en-US" b="1" dirty="0" err="1"/>
+              <a:t>Importance</a:t>
+            </a:r>
+            <a:r>
+              <a:rPr lang="en-US" dirty="0"/>
+              <a:t>: While not technically part of deep learning, SVMs laid foundational groundwork for understanding how to effectively separate complex datasets. They were especially powerful for smaller datasets and high-dimensional </a:t>
+            </a:r>
+            <a:r>
+              <a:rPr lang="en-US" dirty="0" err="1"/>
+              <a:t>spaces.</a:t>
+            </a:r>
+            <a:r>
+              <a:rPr lang="en-US" b="1" dirty="0" err="1"/>
+              <a:t>Applications</a:t>
+            </a:r>
+            <a:r>
+              <a:rPr lang="en-US" dirty="0"/>
+              <a:t>: Used in text categorization, image classification, and even bioinformatics for tasks like protein classification.</a:t>
             </a:r>
           </a:p>
         </p:txBody>
@@ -2069,11 +2140,150 @@
           <a:p>
             <a:pPr>
               <a:buFont typeface="Arial" panose="020B0604020202020204" pitchFamily="34" charset="0"/>
+              <a:buNone/>
+            </a:pPr>
+            <a:r>
+              <a:rPr lang="en-US" dirty="0"/>
+              <a:t>Recurrent Neural Networks (RNNs) were crucial for sequence data processing – information can pass between layers in two directions rather than just forward -  but they struggled with the vanishing gradient problem, which was later addressed by Long Short-Term Memory (LSTM) networks. Unlike standard feedforward networks, RNNs introduce loops, allowing information to persist. This structure makes them well-suited for sequence data, such as time series, language, and speech.</a:t>
+            </a:r>
+          </a:p>
+          <a:p>
+            <a:pPr>
+              <a:buFont typeface="Arial" panose="020B0604020202020204" pitchFamily="34" charset="0"/>
+              <a:buNone/>
+            </a:pPr>
+            <a:endParaRPr lang="en-US" dirty="0"/>
+          </a:p>
+          <a:p>
+            <a:pPr>
+              <a:buFont typeface="Arial" panose="020B0604020202020204" pitchFamily="34" charset="0"/>
               <a:buChar char="•"/>
             </a:pPr>
             <a:r>
               <a:rPr lang="en-US" dirty="0"/>
-              <a:t>Support Vector Machines (SVMs) became popular for their effectiveness in classification and regression tasks, especially in high-dimensional spaces. Recurrent Neural Networks (RNNs) were crucial for sequence data processing – information can pass between layers in two directions rather than just forward -  but they struggled with the vanishing gradient problem, which was later addressed by Long Short-Term Memory (LSTM) networks. Deep Belief Networks (DBNs), introduced by Geoffrey Hinton, allowed for the layer-wise pre-training of deep networks, making it possible to train deeper models effectively.  In the vanishing gradient problem, it becomes more difficult train layers closer to the input because the gradient becomes so small that it “disappears” by the time you work all the way back that far.  </a:t>
+              <a:t>The </a:t>
+            </a:r>
+            <a:r>
+              <a:rPr lang="en-US" b="1" dirty="0"/>
+              <a:t>vanishing gradient problem</a:t>
+            </a:r>
+            <a:r>
+              <a:rPr lang="en-US" dirty="0"/>
+              <a:t> is a challenge encountered when training deep neural networks, particularly those with many layers or recurrent structures like Recurrent Neural Networks (RNNs). It occurs during backpropagation, the process used to compute gradients and update the weights of the network.</a:t>
+            </a:r>
+          </a:p>
+          <a:p>
+            <a:pPr>
+              <a:buFont typeface="Arial" panose="020B0604020202020204" pitchFamily="34" charset="0"/>
+              <a:buChar char="•"/>
+            </a:pPr>
+            <a:endParaRPr lang="en-US" dirty="0"/>
+          </a:p>
+          <a:p>
+            <a:pPr>
+              <a:buFont typeface="Arial" panose="020B0604020202020204" pitchFamily="34" charset="0"/>
+              <a:buChar char="•"/>
+            </a:pPr>
+            <a:r>
+              <a:rPr lang="en-US" b="1" dirty="0"/>
+              <a:t>In deeper networks</a:t>
+            </a:r>
+            <a:r>
+              <a:rPr lang="en-US" dirty="0"/>
+              <a:t>: By the time the gradient reaches earlier layers, it becomes almost zero. This effectively stops those layers from learning because their weights are not updated significantly.</a:t>
+            </a:r>
+          </a:p>
+          <a:p>
+            <a:r>
+              <a:rPr lang="en-US" b="1" dirty="0"/>
+              <a:t>Why Is This a Problem?</a:t>
+            </a:r>
+          </a:p>
+          <a:p>
+            <a:pPr>
+              <a:buFont typeface="+mj-lt"/>
+              <a:buAutoNum type="arabicPeriod"/>
+            </a:pPr>
+            <a:r>
+              <a:rPr lang="en-US" b="1" dirty="0"/>
+              <a:t>Earlier Layers Stop Learning</a:t>
+            </a:r>
+            <a:r>
+              <a:rPr lang="en-US" dirty="0"/>
+              <a:t>: The layers closer to the input receive almost no gradient signal, preventing them from learning useful features.</a:t>
+            </a:r>
+          </a:p>
+          <a:p>
+            <a:pPr>
+              <a:buFont typeface="+mj-lt"/>
+              <a:buAutoNum type="arabicPeriod"/>
+            </a:pPr>
+            <a:r>
+              <a:rPr lang="en-US" b="1" dirty="0"/>
+              <a:t>Slow Convergence</a:t>
+            </a:r>
+            <a:r>
+              <a:rPr lang="en-US" dirty="0"/>
+              <a:t>: Training becomes very slow because the network struggles to adjust its weights.</a:t>
+            </a:r>
+          </a:p>
+          <a:p>
+            <a:pPr>
+              <a:buFont typeface="+mj-lt"/>
+              <a:buAutoNum type="arabicPeriod"/>
+            </a:pPr>
+            <a:r>
+              <a:rPr lang="en-US" b="1" dirty="0"/>
+              <a:t>Limited Representational Power</a:t>
+            </a:r>
+            <a:r>
+              <a:rPr lang="en-US" dirty="0"/>
+              <a:t>: Without proper updates to earlier layers, the network can't effectively capture hierarchical or complex patterns in data.</a:t>
+            </a:r>
+          </a:p>
+          <a:p>
+            <a:pPr>
+              <a:buFont typeface="Arial" panose="020B0604020202020204" pitchFamily="34" charset="0"/>
+              <a:buNone/>
+            </a:pPr>
+            <a:endParaRPr lang="en-US" dirty="0"/>
+          </a:p>
+          <a:p>
+            <a:pPr>
+              <a:buFont typeface="Arial" panose="020B0604020202020204" pitchFamily="34" charset="0"/>
+              <a:buNone/>
+            </a:pPr>
+            <a:endParaRPr lang="en-US" dirty="0"/>
+          </a:p>
+          <a:p>
+            <a:pPr>
+              <a:buFont typeface="Arial" panose="020B0604020202020204" pitchFamily="34" charset="0"/>
+              <a:buNone/>
+            </a:pPr>
+            <a:r>
+              <a:rPr lang="en-US" b="1" dirty="0"/>
+              <a:t>LSTMs (1997)</a:t>
+            </a:r>
+            <a:r>
+              <a:rPr lang="en-US" dirty="0"/>
+              <a:t>: Highlight how Long Short-Term Memory networks solved the vanishing gradient problem by introducing gates that controlled information flow, allowing them to capture long-term dependencies in data such as time series or text.</a:t>
+            </a:r>
+          </a:p>
+          <a:p>
+            <a:pPr>
+              <a:buFont typeface="Arial" panose="020B0604020202020204" pitchFamily="34" charset="0"/>
+              <a:buNone/>
+            </a:pPr>
+            <a:endParaRPr lang="en-US" dirty="0"/>
+          </a:p>
+          <a:p>
+            <a:pPr>
+              <a:buFont typeface="Arial" panose="020B0604020202020204" pitchFamily="34" charset="0"/>
+              <a:buNone/>
+            </a:pPr>
+            <a:r>
+              <a:rPr lang="en-US" dirty="0"/>
+              <a:t>LSTMs became instrumental in tasks like machine translation (e.g., Google Translate), speech-to-text systems, and text summarization.</a:t>
             </a:r>
           </a:p>
         </p:txBody>
@@ -3847,7 +4057,7 @@
           <a:p>
             <a:fld id="{5BCAD085-E8A6-8845-BD4E-CB4CCA059FC4}" type="datetimeFigureOut">
               <a:rPr lang="en-US" smtClean="0"/>
-              <a:t>12/25/2024</a:t>
+              <a:t>12/27/2024</a:t>
             </a:fld>
             <a:endParaRPr lang="en-US"/>
           </a:p>
@@ -4015,7 +4225,7 @@
           <a:p>
             <a:fld id="{5BCAD085-E8A6-8845-BD4E-CB4CCA059FC4}" type="datetimeFigureOut">
               <a:rPr lang="en-US" smtClean="0"/>
-              <a:t>12/25/2024</a:t>
+              <a:t>12/27/2024</a:t>
             </a:fld>
             <a:endParaRPr lang="en-US"/>
           </a:p>
@@ -4193,7 +4403,7 @@
           <a:p>
             <a:fld id="{5BCAD085-E8A6-8845-BD4E-CB4CCA059FC4}" type="datetimeFigureOut">
               <a:rPr lang="en-US" smtClean="0"/>
-              <a:t>12/25/2024</a:t>
+              <a:t>12/27/2024</a:t>
             </a:fld>
             <a:endParaRPr lang="en-US"/>
           </a:p>
@@ -4361,7 +4571,7 @@
           <a:p>
             <a:fld id="{5BCAD085-E8A6-8845-BD4E-CB4CCA059FC4}" type="datetimeFigureOut">
               <a:rPr lang="en-US" smtClean="0"/>
-              <a:t>12/25/2024</a:t>
+              <a:t>12/27/2024</a:t>
             </a:fld>
             <a:endParaRPr lang="en-US"/>
           </a:p>
@@ -4606,7 +4816,7 @@
           <a:p>
             <a:fld id="{5BCAD085-E8A6-8845-BD4E-CB4CCA059FC4}" type="datetimeFigureOut">
               <a:rPr lang="en-US" smtClean="0"/>
-              <a:t>12/25/2024</a:t>
+              <a:t>12/27/2024</a:t>
             </a:fld>
             <a:endParaRPr lang="en-US"/>
           </a:p>
@@ -4891,7 +5101,7 @@
           <a:p>
             <a:fld id="{5BCAD085-E8A6-8845-BD4E-CB4CCA059FC4}" type="datetimeFigureOut">
               <a:rPr lang="en-US" smtClean="0"/>
-              <a:t>12/25/2024</a:t>
+              <a:t>12/27/2024</a:t>
             </a:fld>
             <a:endParaRPr lang="en-US"/>
           </a:p>
@@ -5310,7 +5520,7 @@
           <a:p>
             <a:fld id="{5BCAD085-E8A6-8845-BD4E-CB4CCA059FC4}" type="datetimeFigureOut">
               <a:rPr lang="en-US" smtClean="0"/>
-              <a:t>12/25/2024</a:t>
+              <a:t>12/27/2024</a:t>
             </a:fld>
             <a:endParaRPr lang="en-US"/>
           </a:p>
@@ -5427,7 +5637,7 @@
           <a:p>
             <a:fld id="{5BCAD085-E8A6-8845-BD4E-CB4CCA059FC4}" type="datetimeFigureOut">
               <a:rPr lang="en-US" smtClean="0"/>
-              <a:t>12/25/2024</a:t>
+              <a:t>12/27/2024</a:t>
             </a:fld>
             <a:endParaRPr lang="en-US"/>
           </a:p>
@@ -5522,7 +5732,7 @@
           <a:p>
             <a:fld id="{5BCAD085-E8A6-8845-BD4E-CB4CCA059FC4}" type="datetimeFigureOut">
               <a:rPr lang="en-US" smtClean="0"/>
-              <a:t>12/25/2024</a:t>
+              <a:t>12/27/2024</a:t>
             </a:fld>
             <a:endParaRPr lang="en-US"/>
           </a:p>
@@ -5797,7 +6007,7 @@
           <a:p>
             <a:fld id="{5BCAD085-E8A6-8845-BD4E-CB4CCA059FC4}" type="datetimeFigureOut">
               <a:rPr lang="en-US" smtClean="0"/>
-              <a:t>12/25/2024</a:t>
+              <a:t>12/27/2024</a:t>
             </a:fld>
             <a:endParaRPr lang="en-US"/>
           </a:p>
@@ -6049,7 +6259,7 @@
           <a:p>
             <a:fld id="{5BCAD085-E8A6-8845-BD4E-CB4CCA059FC4}" type="datetimeFigureOut">
               <a:rPr lang="en-US" smtClean="0"/>
-              <a:t>12/25/2024</a:t>
+              <a:t>12/27/2024</a:t>
             </a:fld>
             <a:endParaRPr lang="en-US"/>
           </a:p>
@@ -6260,7 +6470,7 @@
           <a:p>
             <a:fld id="{5BCAD085-E8A6-8845-BD4E-CB4CCA059FC4}" type="datetimeFigureOut">
               <a:rPr lang="en-US" smtClean="0"/>
-              <a:t>12/25/2024</a:t>
+              <a:t>12/27/2024</a:t>
             </a:fld>
             <a:endParaRPr lang="en-US"/>
           </a:p>

</xml_diff>

<commit_message>
Update learning model presentation
</commit_message>
<xml_diff>
--- a/AI Learning Systems.pptx
+++ b/AI Learning Systems.pptx
@@ -512,7 +512,7 @@
           <a:p>
             <a:fld id="{CC9680B7-A211-431D-B6B2-815D19B7BD70}" type="datetimeFigureOut">
               <a:rPr lang="en-US" smtClean="0"/>
-              <a:t>5/31/25</a:t>
+              <a:t>6/13/25</a:t>
             </a:fld>
             <a:endParaRPr lang="en-US"/>
           </a:p>
@@ -1434,15 +1434,7 @@
           <a:p>
             <a:r>
               <a:rPr lang="en-US" dirty="0"/>
-              <a:t>The transition to deep learning has enabled AI to handle unstructured data—like images, audio, and text—with unprecedented </a:t>
-            </a:r>
-            <a:r>
-              <a:rPr lang="en-US" dirty="0" err="1"/>
-              <a:t>accuracy.Advances</a:t>
-            </a:r>
-            <a:r>
-              <a:rPr lang="en-US" dirty="0"/>
-              <a:t> like LSTMs and CNNs have transformed fields ranging from healthcare (e.g., medical image analysis) to entertainment (e.g., personalized recommendations on streaming platforms).Deep learning has set the stage for more complex architectures, like transformers, which have further expanded AI’s capabilities.</a:t>
+              <a:t>The transition to deep learning has enabled AI to handle unstructured data—like images, audio, and text—with unprecedented accuracy. Advances like LSTMs and CNNs have transformed fields ranging from healthcare (e.g., medical image analysis) to entertainment (e.g., personalized recommendations on streaming platforms).Deep learning has set the stage for more complex architectures, like transformers, which have further expanded AI’s capabilities.</a:t>
             </a:r>
           </a:p>
         </p:txBody>
@@ -2946,7 +2938,7 @@
           <a:p>
             <a:fld id="{5BCAD085-E8A6-8845-BD4E-CB4CCA059FC4}" type="datetimeFigureOut">
               <a:rPr lang="en-US" smtClean="0"/>
-              <a:t>5/31/25</a:t>
+              <a:t>6/13/25</a:t>
             </a:fld>
             <a:endParaRPr lang="en-US"/>
           </a:p>
@@ -3114,7 +3106,7 @@
           <a:p>
             <a:fld id="{5BCAD085-E8A6-8845-BD4E-CB4CCA059FC4}" type="datetimeFigureOut">
               <a:rPr lang="en-US" smtClean="0"/>
-              <a:t>5/31/25</a:t>
+              <a:t>6/13/25</a:t>
             </a:fld>
             <a:endParaRPr lang="en-US"/>
           </a:p>
@@ -3292,7 +3284,7 @@
           <a:p>
             <a:fld id="{5BCAD085-E8A6-8845-BD4E-CB4CCA059FC4}" type="datetimeFigureOut">
               <a:rPr lang="en-US" smtClean="0"/>
-              <a:t>5/31/25</a:t>
+              <a:t>6/13/25</a:t>
             </a:fld>
             <a:endParaRPr lang="en-US"/>
           </a:p>
@@ -3460,7 +3452,7 @@
           <a:p>
             <a:fld id="{5BCAD085-E8A6-8845-BD4E-CB4CCA059FC4}" type="datetimeFigureOut">
               <a:rPr lang="en-US" smtClean="0"/>
-              <a:t>5/31/25</a:t>
+              <a:t>6/13/25</a:t>
             </a:fld>
             <a:endParaRPr lang="en-US"/>
           </a:p>
@@ -3705,7 +3697,7 @@
           <a:p>
             <a:fld id="{5BCAD085-E8A6-8845-BD4E-CB4CCA059FC4}" type="datetimeFigureOut">
               <a:rPr lang="en-US" smtClean="0"/>
-              <a:t>5/31/25</a:t>
+              <a:t>6/13/25</a:t>
             </a:fld>
             <a:endParaRPr lang="en-US"/>
           </a:p>
@@ -3990,7 +3982,7 @@
           <a:p>
             <a:fld id="{5BCAD085-E8A6-8845-BD4E-CB4CCA059FC4}" type="datetimeFigureOut">
               <a:rPr lang="en-US" smtClean="0"/>
-              <a:t>5/31/25</a:t>
+              <a:t>6/13/25</a:t>
             </a:fld>
             <a:endParaRPr lang="en-US"/>
           </a:p>
@@ -4409,7 +4401,7 @@
           <a:p>
             <a:fld id="{5BCAD085-E8A6-8845-BD4E-CB4CCA059FC4}" type="datetimeFigureOut">
               <a:rPr lang="en-US" smtClean="0"/>
-              <a:t>5/31/25</a:t>
+              <a:t>6/13/25</a:t>
             </a:fld>
             <a:endParaRPr lang="en-US"/>
           </a:p>
@@ -4526,7 +4518,7 @@
           <a:p>
             <a:fld id="{5BCAD085-E8A6-8845-BD4E-CB4CCA059FC4}" type="datetimeFigureOut">
               <a:rPr lang="en-US" smtClean="0"/>
-              <a:t>5/31/25</a:t>
+              <a:t>6/13/25</a:t>
             </a:fld>
             <a:endParaRPr lang="en-US"/>
           </a:p>
@@ -4621,7 +4613,7 @@
           <a:p>
             <a:fld id="{5BCAD085-E8A6-8845-BD4E-CB4CCA059FC4}" type="datetimeFigureOut">
               <a:rPr lang="en-US" smtClean="0"/>
-              <a:t>5/31/25</a:t>
+              <a:t>6/13/25</a:t>
             </a:fld>
             <a:endParaRPr lang="en-US"/>
           </a:p>
@@ -4896,7 +4888,7 @@
           <a:p>
             <a:fld id="{5BCAD085-E8A6-8845-BD4E-CB4CCA059FC4}" type="datetimeFigureOut">
               <a:rPr lang="en-US" smtClean="0"/>
-              <a:t>5/31/25</a:t>
+              <a:t>6/13/25</a:t>
             </a:fld>
             <a:endParaRPr lang="en-US"/>
           </a:p>
@@ -5148,7 +5140,7 @@
           <a:p>
             <a:fld id="{5BCAD085-E8A6-8845-BD4E-CB4CCA059FC4}" type="datetimeFigureOut">
               <a:rPr lang="en-US" smtClean="0"/>
-              <a:t>5/31/25</a:t>
+              <a:t>6/13/25</a:t>
             </a:fld>
             <a:endParaRPr lang="en-US"/>
           </a:p>
@@ -5359,7 +5351,7 @@
           <a:p>
             <a:fld id="{5BCAD085-E8A6-8845-BD4E-CB4CCA059FC4}" type="datetimeFigureOut">
               <a:rPr lang="en-US" smtClean="0"/>
-              <a:t>5/31/25</a:t>
+              <a:t>6/13/25</a:t>
             </a:fld>
             <a:endParaRPr lang="en-US"/>
           </a:p>
@@ -6194,21 +6186,226 @@
           <a:chExt cx="0" cy="0"/>
         </a:xfrm>
       </p:grpSpPr>
-      <p:sp useBgFill="1">
-        <p:nvSpPr>
-          <p:cNvPr id="16" name="Slide Background">
+      <p:sp>
+        <p:nvSpPr>
+          <p:cNvPr id="2" name="Title 1"/>
+          <p:cNvSpPr>
+            <a:spLocks noGrp="1"/>
+          </p:cNvSpPr>
+          <p:nvPr>
+            <p:ph type="title"/>
+          </p:nvPr>
+        </p:nvSpPr>
+        <p:spPr>
+          <a:xfrm>
+            <a:off x="569750" y="160863"/>
+            <a:ext cx="3448311" cy="1616203"/>
+          </a:xfrm>
+        </p:spPr>
+        <p:txBody>
+          <a:bodyPr anchor="b">
+            <a:normAutofit/>
+          </a:bodyPr>
+          <a:lstStyle/>
+          <a:p>
+            <a:r>
+              <a:rPr lang="en-US" sz="2800" dirty="0"/>
+              <a:t>The Internet and Big Data</a:t>
+            </a:r>
+          </a:p>
+        </p:txBody>
+      </p:sp>
+      <p:sp>
+        <p:nvSpPr>
+          <p:cNvPr id="3" name="Content Placeholder 2"/>
+          <p:cNvSpPr>
+            <a:spLocks noGrp="1"/>
+          </p:cNvSpPr>
+          <p:nvPr>
+            <p:ph idx="1"/>
+          </p:nvPr>
+        </p:nvSpPr>
+        <p:spPr>
+          <a:xfrm>
+            <a:off x="299256" y="2110432"/>
+            <a:ext cx="3989297" cy="3447832"/>
+          </a:xfrm>
+        </p:spPr>
+        <p:txBody>
+          <a:bodyPr anchor="t">
+            <a:noAutofit/>
+          </a:bodyPr>
+          <a:lstStyle/>
+          <a:p>
+            <a:pPr>
+              <a:lnSpc>
+                <a:spcPct val="90000"/>
+              </a:lnSpc>
+            </a:pPr>
+            <a:r>
+              <a:rPr lang="en-US" sz="2000" dirty="0"/>
+              <a:t>Explosion of data from the internet</a:t>
+            </a:r>
+          </a:p>
+          <a:p>
+            <a:pPr>
+              <a:lnSpc>
+                <a:spcPct val="90000"/>
+              </a:lnSpc>
+            </a:pPr>
+            <a:r>
+              <a:rPr lang="en-US" sz="2000" dirty="0"/>
+              <a:t>Development of large datasets for training AI models:</a:t>
+            </a:r>
+          </a:p>
+          <a:p>
+            <a:pPr lvl="1">
+              <a:lnSpc>
+                <a:spcPct val="90000"/>
+              </a:lnSpc>
+            </a:pPr>
+            <a:r>
+              <a:rPr lang="en-US" sz="2000" dirty="0">
+                <a:hlinkClick r:id="rId3"/>
+              </a:rPr>
+              <a:t>Brown Corpus </a:t>
+            </a:r>
+            <a:r>
+              <a:rPr lang="en-US" sz="2000" dirty="0"/>
+              <a:t>(1961): One of the first large text corpora</a:t>
+            </a:r>
+          </a:p>
+          <a:p>
+            <a:pPr lvl="1">
+              <a:lnSpc>
+                <a:spcPct val="90000"/>
+              </a:lnSpc>
+            </a:pPr>
+            <a:r>
+              <a:rPr lang="en-US" sz="2000" dirty="0">
+                <a:hlinkClick r:id="rId4"/>
+              </a:rPr>
+              <a:t>MNIST</a:t>
+            </a:r>
+            <a:r>
+              <a:rPr lang="en-US" sz="2000" dirty="0"/>
+              <a:t> (1998): Handwritten digit database</a:t>
+            </a:r>
+          </a:p>
+          <a:p>
+            <a:pPr lvl="1">
+              <a:lnSpc>
+                <a:spcPct val="90000"/>
+              </a:lnSpc>
+            </a:pPr>
+            <a:r>
+              <a:rPr lang="en-US" sz="2000" dirty="0">
+                <a:hlinkClick r:id="rId5"/>
+              </a:rPr>
+              <a:t>ImageNet</a:t>
+            </a:r>
+            <a:r>
+              <a:rPr lang="en-US" sz="2000" dirty="0"/>
+              <a:t> (2009): Contained millions of labeled images</a:t>
+            </a:r>
+          </a:p>
+          <a:p>
+            <a:pPr lvl="1">
+              <a:lnSpc>
+                <a:spcPct val="90000"/>
+              </a:lnSpc>
+            </a:pPr>
+            <a:r>
+              <a:rPr lang="en-US" sz="2000" dirty="0">
+                <a:hlinkClick r:id="rId6"/>
+              </a:rPr>
+              <a:t>CIFAR-10</a:t>
+            </a:r>
+            <a:r>
+              <a:rPr lang="en-US" sz="2000" dirty="0"/>
+              <a:t> (2009): 60,000 32x32 color images in 10 classes</a:t>
+            </a:r>
+          </a:p>
+          <a:p>
+            <a:pPr lvl="1">
+              <a:lnSpc>
+                <a:spcPct val="90000"/>
+              </a:lnSpc>
+            </a:pPr>
+            <a:r>
+              <a:rPr lang="en-US" sz="2000" dirty="0">
+                <a:hlinkClick r:id="rId7"/>
+              </a:rPr>
+              <a:t>COCO</a:t>
+            </a:r>
+            <a:r>
+              <a:rPr lang="en-US" sz="2000" dirty="0"/>
+              <a:t> (2014): Common Objects in Context dataset</a:t>
+            </a:r>
+          </a:p>
+        </p:txBody>
+      </p:sp>
+      <p:pic>
+        <p:nvPicPr>
+          <p:cNvPr id="5122" name="Picture 2" descr="MNIST sample images">
             <a:extLst>
               <a:ext uri="{FF2B5EF4-FFF2-40B4-BE49-F238E27FC236}">
-                <a16:creationId xmlns:a16="http://schemas.microsoft.com/office/drawing/2014/main" id="{9F7D5CDA-D291-4307-BF55-1381FED29634}"/>
+                <a16:creationId xmlns:a16="http://schemas.microsoft.com/office/drawing/2014/main" id="{1E908157-4E26-4B1C-6929-B1616923BEE3}"/>
+              </a:ext>
+            </a:extLst>
+          </p:cNvPr>
+          <p:cNvPicPr>
+            <a:picLocks noChangeAspect="1" noChangeArrowheads="1"/>
+          </p:cNvPicPr>
+          <p:nvPr/>
+        </p:nvPicPr>
+        <p:blipFill>
+          <a:blip r:embed="rId8">
+            <a:extLst>
+              <a:ext uri="{28A0092B-C50C-407E-A947-70E740481C1C}">
+                <a14:useLocalDpi xmlns:a14="http://schemas.microsoft.com/office/drawing/2010/main" val="0"/>
+              </a:ext>
+            </a:extLst>
+          </a:blip>
+          <a:stretch>
+            <a:fillRect/>
+          </a:stretch>
+        </p:blipFill>
+        <p:spPr bwMode="auto">
+          <a:xfrm>
+            <a:off x="4572000" y="2404108"/>
+            <a:ext cx="3989297" cy="1974702"/>
+          </a:xfrm>
+          <a:prstGeom prst="rect">
+            <a:avLst/>
+          </a:prstGeom>
+          <a:noFill/>
+          <a:extLst>
+            <a:ext uri="{909E8E84-426E-40DD-AFC4-6F175D3DCCD1}">
+              <a14:hiddenFill xmlns:a14="http://schemas.microsoft.com/office/drawing/2010/main">
+                <a:solidFill>
+                  <a:srgbClr val="FFFFFF"/>
+                </a:solidFill>
+              </a14:hiddenFill>
+            </a:ext>
+          </a:extLst>
+        </p:spPr>
+      </p:pic>
+      <p:grpSp>
+        <p:nvGrpSpPr>
+          <p:cNvPr id="5127" name="Group 5126">
+            <a:extLst>
+              <a:ext uri="{FF2B5EF4-FFF2-40B4-BE49-F238E27FC236}">
+                <a16:creationId xmlns:a16="http://schemas.microsoft.com/office/drawing/2014/main" id="{1FD67D68-9B83-C338-8342-3348D8F22347}"/>
               </a:ext>
               <a:ext uri="{C183D7F6-B498-43B3-948B-1728B52AA6E4}">
                 <adec:decorative xmlns:adec="http://schemas.microsoft.com/office/drawing/2017/decorative" val="1"/>
               </a:ext>
             </a:extLst>
           </p:cNvPr>
-          <p:cNvSpPr>
-            <a:spLocks noGrp="1" noRot="1" noChangeAspect="1" noMove="1" noResize="1" noEditPoints="1" noAdjustHandles="1" noChangeArrowheads="1" noChangeShapeType="1" noTextEdit="1"/>
-          </p:cNvSpPr>
+          <p:cNvGrpSpPr>
+            <a:grpSpLocks noGrp="1" noUngrp="1" noRot="1" noChangeAspect="1" noMove="1" noResize="1"/>
+          </p:cNvGrpSpPr>
           <p:nvPr>
             <p:extLst>
               <p:ext uri="{386F3935-93C4-4BCD-93E2-E3B085C9AB24}">
@@ -6216,239 +6413,159 @@
               </p:ext>
             </p:extLst>
           </p:nvPr>
-        </p:nvSpPr>
-        <p:spPr>
+        </p:nvGrpSpPr>
+        <p:grpSpPr>
           <a:xfrm>
-            <a:off x="0" y="0"/>
-            <a:ext cx="9144000" cy="6858000"/>
+            <a:off x="-3768" y="6737718"/>
+            <a:ext cx="9155399" cy="123363"/>
+            <a:chOff x="-5025" y="6737718"/>
+            <a:chExt cx="12207200" cy="123363"/>
           </a:xfrm>
-          <a:prstGeom prst="rect">
-            <a:avLst/>
-          </a:prstGeom>
-          <a:ln>
-            <a:noFill/>
-          </a:ln>
-        </p:spPr>
-        <p:style>
-          <a:lnRef idx="2">
-            <a:schemeClr val="accent1">
-              <a:shade val="50000"/>
-            </a:schemeClr>
-          </a:lnRef>
-          <a:fillRef idx="1">
-            <a:schemeClr val="accent1"/>
-          </a:fillRef>
-          <a:effectRef idx="0">
-            <a:schemeClr val="accent1"/>
-          </a:effectRef>
-          <a:fontRef idx="minor">
-            <a:schemeClr val="lt1"/>
-          </a:fontRef>
-        </p:style>
-        <p:txBody>
-          <a:bodyPr rtlCol="0" anchor="ctr"/>
-          <a:lstStyle/>
-          <a:p>
-            <a:pPr algn="ctr"/>
-            <a:endParaRPr lang="en-US"/>
-          </a:p>
-        </p:txBody>
-      </p:sp>
-      <p:sp>
-        <p:nvSpPr>
-          <p:cNvPr id="2" name="Title 1"/>
-          <p:cNvSpPr>
-            <a:spLocks noGrp="1"/>
-          </p:cNvSpPr>
-          <p:nvPr>
-            <p:ph type="title"/>
-          </p:nvPr>
-        </p:nvSpPr>
-        <p:spPr>
-          <a:xfrm>
-            <a:off x="571350" y="166611"/>
-            <a:ext cx="4000647" cy="1708242"/>
-          </a:xfrm>
-        </p:spPr>
-        <p:txBody>
-          <a:bodyPr anchor="ctr">
-            <a:normAutofit/>
-          </a:bodyPr>
-          <a:lstStyle/>
-          <a:p>
-            <a:r>
-              <a:rPr lang="en-US" sz="3500" dirty="0"/>
-              <a:t>The Internet and Big Data</a:t>
-            </a:r>
-          </a:p>
-        </p:txBody>
-      </p:sp>
-      <p:sp>
-        <p:nvSpPr>
-          <p:cNvPr id="3" name="Content Placeholder 2"/>
-          <p:cNvSpPr>
-            <a:spLocks noGrp="1"/>
-          </p:cNvSpPr>
-          <p:nvPr>
-            <p:ph idx="1"/>
-          </p:nvPr>
-        </p:nvSpPr>
-        <p:spPr>
-          <a:xfrm>
-            <a:off x="111318" y="2470244"/>
-            <a:ext cx="4961614" cy="3769835"/>
-          </a:xfrm>
-        </p:spPr>
-        <p:txBody>
-          <a:bodyPr anchor="ctr">
-            <a:noAutofit/>
-          </a:bodyPr>
-          <a:lstStyle/>
-          <a:p>
-            <a:pPr>
-              <a:lnSpc>
-                <a:spcPct val="90000"/>
-              </a:lnSpc>
-            </a:pPr>
-            <a:r>
-              <a:rPr lang="en-US" sz="2400" dirty="0"/>
-              <a:t>Explosion of data from the internet</a:t>
-            </a:r>
-          </a:p>
-          <a:p>
-            <a:pPr>
-              <a:lnSpc>
-                <a:spcPct val="90000"/>
-              </a:lnSpc>
-            </a:pPr>
-            <a:r>
-              <a:rPr lang="en-US" sz="2400" dirty="0"/>
-              <a:t>Development of large datasets for training AI models:</a:t>
-            </a:r>
-          </a:p>
-          <a:p>
-            <a:pPr lvl="1">
-              <a:lnSpc>
-                <a:spcPct val="90000"/>
-              </a:lnSpc>
-            </a:pPr>
-            <a:r>
-              <a:rPr lang="en-US" sz="2000" dirty="0">
-                <a:hlinkClick r:id="rId3"/>
-              </a:rPr>
-              <a:t>Brown Corpus </a:t>
-            </a:r>
-            <a:r>
-              <a:rPr lang="en-US" sz="2000" dirty="0"/>
-              <a:t>(1961): One of the first large text corpora</a:t>
-            </a:r>
-          </a:p>
-          <a:p>
-            <a:pPr lvl="1">
-              <a:lnSpc>
-                <a:spcPct val="90000"/>
-              </a:lnSpc>
-            </a:pPr>
-            <a:r>
-              <a:rPr lang="en-US" sz="2000" dirty="0">
-                <a:hlinkClick r:id="rId4"/>
-              </a:rPr>
-              <a:t>MNIST</a:t>
-            </a:r>
-            <a:r>
-              <a:rPr lang="en-US" sz="2000" dirty="0"/>
-              <a:t> (1998): Handwritten digit database</a:t>
-            </a:r>
-          </a:p>
-          <a:p>
-            <a:pPr lvl="1">
-              <a:lnSpc>
-                <a:spcPct val="90000"/>
-              </a:lnSpc>
-            </a:pPr>
-            <a:r>
-              <a:rPr lang="en-US" sz="2000" dirty="0">
-                <a:hlinkClick r:id="rId5"/>
-              </a:rPr>
-              <a:t>ImageNet</a:t>
-            </a:r>
-            <a:r>
-              <a:rPr lang="en-US" sz="2000" dirty="0"/>
-              <a:t> (2009): Contained millions of labeled images</a:t>
-            </a:r>
-          </a:p>
-          <a:p>
-            <a:pPr lvl="1">
-              <a:lnSpc>
-                <a:spcPct val="90000"/>
-              </a:lnSpc>
-            </a:pPr>
-            <a:r>
-              <a:rPr lang="en-US" sz="2000" dirty="0">
-                <a:hlinkClick r:id="rId6"/>
-              </a:rPr>
-              <a:t>CIFAR-10</a:t>
-            </a:r>
-            <a:r>
-              <a:rPr lang="en-US" sz="2000" dirty="0"/>
-              <a:t> (2009): 60,000 32x32 color images in 10 classes</a:t>
-            </a:r>
-          </a:p>
-          <a:p>
-            <a:pPr lvl="1">
-              <a:lnSpc>
-                <a:spcPct val="90000"/>
-              </a:lnSpc>
-            </a:pPr>
-            <a:r>
-              <a:rPr lang="en-US" sz="2000" dirty="0">
-                <a:hlinkClick r:id="rId7"/>
-              </a:rPr>
-              <a:t>COCO</a:t>
-            </a:r>
-            <a:r>
-              <a:rPr lang="en-US" sz="2000" dirty="0"/>
-              <a:t> (2014): Common Objects in Context dataset</a:t>
-            </a:r>
-          </a:p>
-        </p:txBody>
-      </p:sp>
-      <p:pic>
-        <p:nvPicPr>
-          <p:cNvPr id="5" name="Picture 4" descr="Programming data on computer monitor">
-            <a:extLst>
-              <a:ext uri="{FF2B5EF4-FFF2-40B4-BE49-F238E27FC236}">
-                <a16:creationId xmlns:a16="http://schemas.microsoft.com/office/drawing/2014/main" id="{F69E6418-1AD5-6B4F-D739-3D6A191FC2FB}"/>
-              </a:ext>
-            </a:extLst>
-          </p:cNvPr>
-          <p:cNvPicPr>
-            <a:picLocks noChangeAspect="1"/>
-          </p:cNvPicPr>
-          <p:nvPr/>
-        </p:nvPicPr>
-        <p:blipFill rotWithShape="1">
-          <a:blip r:embed="rId8"/>
-          <a:srcRect l="35534" r="25588" b="-1"/>
-          <a:stretch/>
-        </p:blipFill>
-        <p:spPr>
-          <a:xfrm>
-            <a:off x="5143347" y="-10886"/>
-            <a:ext cx="4000653" cy="6868886"/>
-          </a:xfrm>
-          <a:prstGeom prst="rect">
-            <a:avLst/>
-          </a:prstGeom>
-          <a:effectLst>
-            <a:outerShdw blurRad="127000" dist="50800" dir="10800000" sx="99000" sy="99000" algn="r" rotWithShape="0">
-              <a:prstClr val="black">
-                <a:alpha val="40000"/>
-              </a:prstClr>
-            </a:outerShdw>
-          </a:effectLst>
-        </p:spPr>
-      </p:pic>
+        </p:grpSpPr>
+        <p:sp>
+          <p:nvSpPr>
+            <p:cNvPr id="5128" name="Rectangle 5127">
+              <a:extLst>
+                <a:ext uri="{FF2B5EF4-FFF2-40B4-BE49-F238E27FC236}">
+                  <a16:creationId xmlns:a16="http://schemas.microsoft.com/office/drawing/2014/main" id="{1E397F34-6B84-0D3B-0F29-B1D134B3B885}"/>
+                </a:ext>
+                <a:ext uri="{C183D7F6-B498-43B3-948B-1728B52AA6E4}">
+                  <adec:decorative xmlns:adec="http://schemas.microsoft.com/office/drawing/2017/decorative" val="1"/>
+                </a:ext>
+              </a:extLst>
+            </p:cNvPr>
+            <p:cNvSpPr/>
+            <p:nvPr>
+              <p:extLst>
+                <p:ext uri="{386F3935-93C4-4BCD-93E2-E3B085C9AB24}">
+                  <p16:designElem xmlns:p16="http://schemas.microsoft.com/office/powerpoint/2015/main" val="1"/>
+                </p:ext>
+              </p:extLst>
+            </p:nvPr>
+          </p:nvSpPr>
+          <p:spPr>
+            <a:xfrm rot="5400000" flipH="1">
+              <a:off x="6036894" y="695800"/>
+              <a:ext cx="123362" cy="12207199"/>
+            </a:xfrm>
+            <a:prstGeom prst="rect">
+              <a:avLst/>
+            </a:prstGeom>
+            <a:gradFill>
+              <a:gsLst>
+                <a:gs pos="0">
+                  <a:schemeClr val="accent5"/>
+                </a:gs>
+                <a:gs pos="100000">
+                  <a:schemeClr val="accent2"/>
+                </a:gs>
+              </a:gsLst>
+              <a:lin ang="1800000" scaled="0"/>
+            </a:gradFill>
+            <a:ln>
+              <a:noFill/>
+            </a:ln>
+          </p:spPr>
+          <p:style>
+            <a:lnRef idx="2">
+              <a:schemeClr val="accent1">
+                <a:shade val="50000"/>
+              </a:schemeClr>
+            </a:lnRef>
+            <a:fillRef idx="1">
+              <a:schemeClr val="accent1"/>
+            </a:fillRef>
+            <a:effectRef idx="0">
+              <a:schemeClr val="accent1"/>
+            </a:effectRef>
+            <a:fontRef idx="minor">
+              <a:schemeClr val="lt1"/>
+            </a:fontRef>
+          </p:style>
+          <p:txBody>
+            <a:bodyPr rtlCol="0" anchor="ctr"/>
+            <a:lstStyle/>
+            <a:p>
+              <a:pPr algn="ctr"/>
+              <a:endParaRPr lang="en-US"/>
+            </a:p>
+          </p:txBody>
+        </p:sp>
+        <p:sp>
+          <p:nvSpPr>
+            <p:cNvPr id="5129" name="Rectangle 5128">
+              <a:extLst>
+                <a:ext uri="{FF2B5EF4-FFF2-40B4-BE49-F238E27FC236}">
+                  <a16:creationId xmlns:a16="http://schemas.microsoft.com/office/drawing/2014/main" id="{9BD98075-BFC1-BE9C-7FB7-23FE55E43393}"/>
+                </a:ext>
+                <a:ext uri="{C183D7F6-B498-43B3-948B-1728B52AA6E4}">
+                  <adec:decorative xmlns:adec="http://schemas.microsoft.com/office/drawing/2017/decorative" val="1"/>
+                </a:ext>
+              </a:extLst>
+            </p:cNvPr>
+            <p:cNvSpPr/>
+            <p:nvPr>
+              <p:extLst>
+                <p:ext uri="{386F3935-93C4-4BCD-93E2-E3B085C9AB24}">
+                  <p16:designElem xmlns:p16="http://schemas.microsoft.com/office/powerpoint/2015/main" val="1"/>
+                </p:ext>
+              </p:extLst>
+            </p:nvPr>
+          </p:nvSpPr>
+          <p:spPr>
+            <a:xfrm rot="16200000">
+              <a:off x="9176406" y="3835311"/>
+              <a:ext cx="123362" cy="5928176"/>
+            </a:xfrm>
+            <a:prstGeom prst="rect">
+              <a:avLst/>
+            </a:prstGeom>
+            <a:gradFill>
+              <a:gsLst>
+                <a:gs pos="19000">
+                  <a:schemeClr val="accent5">
+                    <a:alpha val="0"/>
+                  </a:schemeClr>
+                </a:gs>
+                <a:gs pos="100000">
+                  <a:schemeClr val="accent5">
+                    <a:lumMod val="60000"/>
+                    <a:lumOff val="40000"/>
+                  </a:schemeClr>
+                </a:gs>
+              </a:gsLst>
+              <a:lin ang="600000" scaled="0"/>
+            </a:gradFill>
+            <a:ln>
+              <a:noFill/>
+            </a:ln>
+          </p:spPr>
+          <p:style>
+            <a:lnRef idx="2">
+              <a:schemeClr val="accent1">
+                <a:shade val="50000"/>
+              </a:schemeClr>
+            </a:lnRef>
+            <a:fillRef idx="1">
+              <a:schemeClr val="accent1"/>
+            </a:fillRef>
+            <a:effectRef idx="0">
+              <a:schemeClr val="accent1"/>
+            </a:effectRef>
+            <a:fontRef idx="minor">
+              <a:schemeClr val="lt1"/>
+            </a:fontRef>
+          </p:style>
+          <p:txBody>
+            <a:bodyPr rtlCol="0" anchor="ctr"/>
+            <a:lstStyle/>
+            <a:p>
+              <a:pPr algn="ctr"/>
+              <a:endParaRPr lang="en-US"/>
+            </a:p>
+          </p:txBody>
+        </p:sp>
+      </p:grpSp>
     </p:spTree>
   </p:cSld>
   <p:clrMapOvr>
@@ -6583,8 +6700,8 @@
         </p:nvSpPr>
         <p:spPr>
           <a:xfrm>
-            <a:off x="79513" y="2470244"/>
-            <a:ext cx="4786685" cy="3769835"/>
+            <a:off x="107852" y="2198724"/>
+            <a:ext cx="4749820" cy="4278275"/>
           </a:xfrm>
         </p:spPr>
         <p:txBody>
@@ -6626,6 +6743,26 @@
             <a:r>
               <a:rPr lang="en-US" sz="2400" dirty="0"/>
               <a:t>Effective in high-dimensional spaces</a:t>
+            </a:r>
+          </a:p>
+          <a:p>
+            <a:pPr>
+              <a:buFont typeface="Arial" panose="020B0604020202020204" pitchFamily="34" charset="0"/>
+              <a:buChar char="•"/>
+            </a:pPr>
+            <a:r>
+              <a:rPr lang="en-US" sz="2400" dirty="0"/>
+              <a:t>Ensemble methods</a:t>
+            </a:r>
+          </a:p>
+          <a:p>
+            <a:pPr lvl="1">
+              <a:buFont typeface="Arial" panose="020B0604020202020204" pitchFamily="34" charset="0"/>
+              <a:buChar char="•"/>
+            </a:pPr>
+            <a:r>
+              <a:rPr lang="en-US" sz="2400" dirty="0"/>
+              <a:t>Allowing many learning models to “vote” on the right classification</a:t>
             </a:r>
           </a:p>
         </p:txBody>
@@ -6771,7 +6908,7 @@
         </p:nvSpPr>
         <p:spPr>
           <a:xfrm>
-            <a:off x="571350" y="762001"/>
+            <a:off x="571350" y="381001"/>
             <a:ext cx="4000647" cy="1708242"/>
           </a:xfrm>
         </p:spPr>
@@ -6782,7 +6919,7 @@
           <a:lstStyle/>
           <a:p>
             <a:r>
-              <a:rPr lang="en-US" sz="3500"/>
+              <a:rPr lang="en-US" sz="3500" dirty="0"/>
               <a:t>The Rise of Deep Learning</a:t>
             </a:r>
           </a:p>
@@ -6815,34 +6952,28 @@
               <a:buChar char="•"/>
             </a:pPr>
             <a:r>
-              <a:rPr lang="en-US" sz="2400" dirty="0">
-                <a:hlinkClick r:id="rId3"/>
-              </a:rPr>
-              <a:t>Recurrent Neural Networks </a:t>
-            </a:r>
-            <a:r>
               <a:rPr lang="en-US" sz="2400" dirty="0"/>
-              <a:t>(RNNs) (1993) and Long Short-Term Memory (LSTM) (2007)</a:t>
-            </a:r>
-          </a:p>
-          <a:p>
-            <a:pPr lvl="1">
+              <a:t>Convolutional Networks (late 1980s, popularized in 1998): Could recognize handwritten digits</a:t>
+            </a:r>
+          </a:p>
+          <a:p>
+            <a:pPr>
               <a:buFont typeface="Arial" panose="020B0604020202020204" pitchFamily="34" charset="0"/>
               <a:buChar char="•"/>
             </a:pPr>
             <a:r>
               <a:rPr lang="en-US" sz="2400" dirty="0"/>
-              <a:t>RNNs: Capable of processing sequences of data</a:t>
-            </a:r>
-          </a:p>
-          <a:p>
-            <a:pPr lvl="1">
+              <a:t>Recurrent Networks (1993): Capable of processing sequences of data</a:t>
+            </a:r>
+          </a:p>
+          <a:p>
+            <a:pPr>
               <a:buFont typeface="Arial" panose="020B0604020202020204" pitchFamily="34" charset="0"/>
               <a:buChar char="•"/>
             </a:pPr>
             <a:r>
               <a:rPr lang="en-US" sz="2400" dirty="0"/>
-              <a:t>LSTM: Addressed vanishing gradient problem in RNNs improving the ability to train RNNs</a:t>
+              <a:t>Long Short-Term Memory (2007): Addressed vanishing gradient problem in RNNs improving the ability to train RNNs</a:t>
             </a:r>
           </a:p>
         </p:txBody>
@@ -6862,7 +6993,7 @@
           <p:nvPr/>
         </p:nvPicPr>
         <p:blipFill rotWithShape="1">
-          <a:blip r:embed="rId4"/>
+          <a:blip r:embed="rId3"/>
           <a:srcRect l="36897" r="24225" b="-1"/>
           <a:stretch/>
         </p:blipFill>
@@ -6921,21 +7052,152 @@
           <a:chExt cx="0" cy="0"/>
         </a:xfrm>
       </p:grpSpPr>
-      <p:sp useBgFill="1">
-        <p:nvSpPr>
-          <p:cNvPr id="20" name="Slide Background">
+      <p:sp>
+        <p:nvSpPr>
+          <p:cNvPr id="2" name="Title 1"/>
+          <p:cNvSpPr>
+            <a:spLocks noGrp="1"/>
+          </p:cNvSpPr>
+          <p:nvPr>
+            <p:ph type="title"/>
+          </p:nvPr>
+        </p:nvSpPr>
+        <p:spPr>
+          <a:xfrm>
+            <a:off x="657519" y="160863"/>
+            <a:ext cx="3448311" cy="1616203"/>
+          </a:xfrm>
+        </p:spPr>
+        <p:txBody>
+          <a:bodyPr anchor="b">
+            <a:normAutofit/>
+          </a:bodyPr>
+          <a:lstStyle/>
+          <a:p>
+            <a:r>
+              <a:rPr lang="en-US" sz="2800" dirty="0"/>
+              <a:t>The Rise of Deep Learning</a:t>
+            </a:r>
+          </a:p>
+        </p:txBody>
+      </p:sp>
+      <p:sp>
+        <p:nvSpPr>
+          <p:cNvPr id="15" name="Content Placeholder 2"/>
+          <p:cNvSpPr>
+            <a:spLocks noGrp="1"/>
+          </p:cNvSpPr>
+          <p:nvPr>
+            <p:ph idx="1"/>
+          </p:nvPr>
+        </p:nvSpPr>
+        <p:spPr>
+          <a:xfrm>
+            <a:off x="116532" y="2067982"/>
+            <a:ext cx="4222712" cy="3447832"/>
+          </a:xfrm>
+        </p:spPr>
+        <p:txBody>
+          <a:bodyPr anchor="t">
+            <a:noAutofit/>
+          </a:bodyPr>
+          <a:lstStyle/>
+          <a:p>
+            <a:pPr lvl="0"/>
+            <a:r>
+              <a:rPr lang="en-US" sz="2400" dirty="0"/>
+              <a:t>Geoffrey Hinton’s Deep Belief Networks (2006) </a:t>
+            </a:r>
+          </a:p>
+          <a:p>
+            <a:pPr lvl="1"/>
+            <a:r>
+              <a:rPr lang="en-US" sz="2400" dirty="0"/>
+              <a:t>showed that unsupervised pre-training could initialize deep architectures</a:t>
+            </a:r>
+          </a:p>
+          <a:p>
+            <a:r>
+              <a:rPr lang="en-US" sz="2400" dirty="0">
+                <a:hlinkClick r:id="rId3"/>
+              </a:rPr>
+              <a:t>IBM Watson </a:t>
+            </a:r>
+            <a:r>
+              <a:rPr lang="en-US" sz="2400" dirty="0"/>
+              <a:t>(2011)Won Jeopardy! against former champions</a:t>
+            </a:r>
+          </a:p>
+          <a:p>
+            <a:pPr lvl="1"/>
+            <a:r>
+              <a:rPr lang="en-US" sz="2400" dirty="0"/>
+              <a:t>Advanced natural language processing</a:t>
+            </a:r>
+          </a:p>
+        </p:txBody>
+      </p:sp>
+      <p:pic>
+        <p:nvPicPr>
+          <p:cNvPr id="6146" name="Picture 2" descr="A person standing in front of a glass wall&#10;&#10;AI-generated content may be incorrect.">
             <a:extLst>
               <a:ext uri="{FF2B5EF4-FFF2-40B4-BE49-F238E27FC236}">
-                <a16:creationId xmlns:a16="http://schemas.microsoft.com/office/drawing/2014/main" id="{9F7D5CDA-D291-4307-BF55-1381FED29634}"/>
+                <a16:creationId xmlns:a16="http://schemas.microsoft.com/office/drawing/2014/main" id="{0F45439C-5BA9-FFFD-DECC-B7B17A801CF9}"/>
+              </a:ext>
+            </a:extLst>
+          </p:cNvPr>
+          <p:cNvPicPr>
+            <a:picLocks noChangeAspect="1" noChangeArrowheads="1"/>
+          </p:cNvPicPr>
+          <p:nvPr/>
+        </p:nvPicPr>
+        <p:blipFill>
+          <a:blip r:embed="rId4">
+            <a:extLst>
+              <a:ext uri="{28A0092B-C50C-407E-A947-70E740481C1C}">
+                <a14:useLocalDpi xmlns:a14="http://schemas.microsoft.com/office/drawing/2010/main" val="0"/>
+              </a:ext>
+            </a:extLst>
+          </a:blip>
+          <a:stretch>
+            <a:fillRect/>
+          </a:stretch>
+        </p:blipFill>
+        <p:spPr bwMode="auto">
+          <a:xfrm>
+            <a:off x="4572000" y="2060031"/>
+            <a:ext cx="3989297" cy="2662855"/>
+          </a:xfrm>
+          <a:prstGeom prst="rect">
+            <a:avLst/>
+          </a:prstGeom>
+          <a:noFill/>
+          <a:extLst>
+            <a:ext uri="{909E8E84-426E-40DD-AFC4-6F175D3DCCD1}">
+              <a14:hiddenFill xmlns:a14="http://schemas.microsoft.com/office/drawing/2010/main">
+                <a:solidFill>
+                  <a:srgbClr val="FFFFFF"/>
+                </a:solidFill>
+              </a14:hiddenFill>
+            </a:ext>
+          </a:extLst>
+        </p:spPr>
+      </p:pic>
+      <p:grpSp>
+        <p:nvGrpSpPr>
+          <p:cNvPr id="6151" name="Group 6150">
+            <a:extLst>
+              <a:ext uri="{FF2B5EF4-FFF2-40B4-BE49-F238E27FC236}">
+                <a16:creationId xmlns:a16="http://schemas.microsoft.com/office/drawing/2014/main" id="{1FD67D68-9B83-C338-8342-3348D8F22347}"/>
               </a:ext>
               <a:ext uri="{C183D7F6-B498-43B3-948B-1728B52AA6E4}">
                 <adec:decorative xmlns:adec="http://schemas.microsoft.com/office/drawing/2017/decorative" val="1"/>
               </a:ext>
             </a:extLst>
           </p:cNvPr>
-          <p:cNvSpPr>
-            <a:spLocks noGrp="1" noRot="1" noChangeAspect="1" noMove="1" noResize="1" noEditPoints="1" noAdjustHandles="1" noChangeArrowheads="1" noChangeShapeType="1" noTextEdit="1"/>
-          </p:cNvSpPr>
+          <p:cNvGrpSpPr>
+            <a:grpSpLocks noGrp="1" noUngrp="1" noRot="1" noChangeAspect="1" noMove="1" noResize="1"/>
+          </p:cNvGrpSpPr>
           <p:nvPr>
             <p:extLst>
               <p:ext uri="{386F3935-93C4-4BCD-93E2-E3B085C9AB24}">
@@ -6943,181 +7205,159 @@
               </p:ext>
             </p:extLst>
           </p:nvPr>
-        </p:nvSpPr>
-        <p:spPr>
+        </p:nvGrpSpPr>
+        <p:grpSpPr>
           <a:xfrm>
-            <a:off x="0" y="0"/>
-            <a:ext cx="9144000" cy="6858000"/>
+            <a:off x="-3768" y="6737718"/>
+            <a:ext cx="9155399" cy="123363"/>
+            <a:chOff x="-5025" y="6737718"/>
+            <a:chExt cx="12207200" cy="123363"/>
           </a:xfrm>
-          <a:prstGeom prst="rect">
-            <a:avLst/>
-          </a:prstGeom>
-          <a:ln>
-            <a:noFill/>
-          </a:ln>
-        </p:spPr>
-        <p:style>
-          <a:lnRef idx="2">
-            <a:schemeClr val="accent1">
-              <a:shade val="50000"/>
-            </a:schemeClr>
-          </a:lnRef>
-          <a:fillRef idx="1">
-            <a:schemeClr val="accent1"/>
-          </a:fillRef>
-          <a:effectRef idx="0">
-            <a:schemeClr val="accent1"/>
-          </a:effectRef>
-          <a:fontRef idx="minor">
-            <a:schemeClr val="lt1"/>
-          </a:fontRef>
-        </p:style>
-        <p:txBody>
-          <a:bodyPr rtlCol="0" anchor="ctr"/>
-          <a:lstStyle/>
-          <a:p>
-            <a:pPr algn="ctr"/>
-            <a:endParaRPr lang="en-US"/>
-          </a:p>
-        </p:txBody>
-      </p:sp>
-      <p:sp>
-        <p:nvSpPr>
-          <p:cNvPr id="2" name="Title 1"/>
-          <p:cNvSpPr>
-            <a:spLocks noGrp="1"/>
-          </p:cNvSpPr>
-          <p:nvPr>
-            <p:ph type="title"/>
-          </p:nvPr>
-        </p:nvSpPr>
-        <p:spPr>
-          <a:xfrm>
-            <a:off x="571349" y="381001"/>
-            <a:ext cx="4000647" cy="1708242"/>
-          </a:xfrm>
-        </p:spPr>
-        <p:txBody>
-          <a:bodyPr anchor="ctr">
-            <a:normAutofit/>
-          </a:bodyPr>
-          <a:lstStyle/>
-          <a:p>
-            <a:r>
-              <a:rPr lang="en-US" sz="3500" dirty="0"/>
-              <a:t>The Rise of Deep Learning</a:t>
-            </a:r>
-          </a:p>
-        </p:txBody>
-      </p:sp>
-      <p:sp>
-        <p:nvSpPr>
-          <p:cNvPr id="15" name="Content Placeholder 2"/>
-          <p:cNvSpPr>
-            <a:spLocks noGrp="1"/>
-          </p:cNvSpPr>
-          <p:nvPr>
-            <p:ph idx="1"/>
-          </p:nvPr>
-        </p:nvSpPr>
-        <p:spPr>
-          <a:xfrm>
-            <a:off x="238540" y="2470244"/>
-            <a:ext cx="4333458" cy="3769835"/>
-          </a:xfrm>
-        </p:spPr>
-        <p:txBody>
-          <a:bodyPr anchor="ctr">
-            <a:noAutofit/>
-          </a:bodyPr>
-          <a:lstStyle/>
-          <a:p>
-            <a:pPr>
-              <a:buFont typeface="Arial" panose="020B0604020202020204" pitchFamily="34" charset="0"/>
-              <a:buChar char="•"/>
-            </a:pPr>
-            <a:r>
-              <a:rPr lang="en-US" sz="2400" dirty="0">
-                <a:hlinkClick r:id="rId3"/>
-              </a:rPr>
-              <a:t>Transfer Learning</a:t>
-            </a:r>
-            <a:endParaRPr lang="en-US" sz="2400" dirty="0"/>
-          </a:p>
-          <a:p>
-            <a:pPr lvl="1">
-              <a:buFont typeface="Arial" panose="020B0604020202020204" pitchFamily="34" charset="0"/>
-              <a:buChar char="•"/>
-            </a:pPr>
-            <a:r>
-              <a:rPr lang="en-US" sz="2400" dirty="0"/>
-              <a:t>Able to learn from one task to complete a similar task</a:t>
-            </a:r>
-          </a:p>
-          <a:p>
-            <a:pPr>
-              <a:buFont typeface="Arial" panose="020B0604020202020204" pitchFamily="34" charset="0"/>
-              <a:buChar char="•"/>
-            </a:pPr>
-            <a:r>
-              <a:rPr lang="en-US" sz="2400" dirty="0">
-                <a:hlinkClick r:id="rId4"/>
-              </a:rPr>
-              <a:t>IBM Watson </a:t>
-            </a:r>
-            <a:r>
-              <a:rPr lang="en-US" sz="2400" dirty="0"/>
-              <a:t>(2011)Won Jeopardy! against former champions</a:t>
-            </a:r>
-          </a:p>
-          <a:p>
-            <a:pPr lvl="1">
-              <a:buFont typeface="Arial" panose="020B0604020202020204" pitchFamily="34" charset="0"/>
-              <a:buChar char="•"/>
-            </a:pPr>
-            <a:r>
-              <a:rPr lang="en-US" sz="2400" dirty="0"/>
-              <a:t>Advanced natural language processing</a:t>
-            </a:r>
-          </a:p>
-        </p:txBody>
-      </p:sp>
-      <p:pic>
-        <p:nvPicPr>
-          <p:cNvPr id="14" name="Picture 13" descr="Models if molecules in science classroom">
-            <a:extLst>
-              <a:ext uri="{FF2B5EF4-FFF2-40B4-BE49-F238E27FC236}">
-                <a16:creationId xmlns:a16="http://schemas.microsoft.com/office/drawing/2014/main" id="{BAB3BE10-7B50-4558-F7F5-C6E7DF43A1A2}"/>
-              </a:ext>
-            </a:extLst>
-          </p:cNvPr>
-          <p:cNvPicPr>
-            <a:picLocks noChangeAspect="1"/>
-          </p:cNvPicPr>
-          <p:nvPr/>
-        </p:nvPicPr>
-        <p:blipFill rotWithShape="1">
-          <a:blip r:embed="rId5"/>
-          <a:srcRect l="33405" r="27718" b="-1"/>
-          <a:stretch/>
-        </p:blipFill>
-        <p:spPr>
-          <a:xfrm>
-            <a:off x="5143347" y="-10886"/>
-            <a:ext cx="4000653" cy="6868886"/>
-          </a:xfrm>
-          <a:prstGeom prst="rect">
-            <a:avLst/>
-          </a:prstGeom>
-          <a:effectLst>
-            <a:outerShdw blurRad="127000" dist="50800" dir="10800000" sx="99000" sy="99000" algn="r" rotWithShape="0">
-              <a:prstClr val="black">
-                <a:alpha val="40000"/>
-              </a:prstClr>
-            </a:outerShdw>
-          </a:effectLst>
-        </p:spPr>
-      </p:pic>
+        </p:grpSpPr>
+        <p:sp>
+          <p:nvSpPr>
+            <p:cNvPr id="6152" name="Rectangle 6151">
+              <a:extLst>
+                <a:ext uri="{FF2B5EF4-FFF2-40B4-BE49-F238E27FC236}">
+                  <a16:creationId xmlns:a16="http://schemas.microsoft.com/office/drawing/2014/main" id="{1E397F34-6B84-0D3B-0F29-B1D134B3B885}"/>
+                </a:ext>
+                <a:ext uri="{C183D7F6-B498-43B3-948B-1728B52AA6E4}">
+                  <adec:decorative xmlns:adec="http://schemas.microsoft.com/office/drawing/2017/decorative" val="1"/>
+                </a:ext>
+              </a:extLst>
+            </p:cNvPr>
+            <p:cNvSpPr/>
+            <p:nvPr>
+              <p:extLst>
+                <p:ext uri="{386F3935-93C4-4BCD-93E2-E3B085C9AB24}">
+                  <p16:designElem xmlns:p16="http://schemas.microsoft.com/office/powerpoint/2015/main" val="1"/>
+                </p:ext>
+              </p:extLst>
+            </p:nvPr>
+          </p:nvSpPr>
+          <p:spPr>
+            <a:xfrm rot="5400000" flipH="1">
+              <a:off x="6036894" y="695800"/>
+              <a:ext cx="123362" cy="12207199"/>
+            </a:xfrm>
+            <a:prstGeom prst="rect">
+              <a:avLst/>
+            </a:prstGeom>
+            <a:gradFill>
+              <a:gsLst>
+                <a:gs pos="0">
+                  <a:schemeClr val="accent5"/>
+                </a:gs>
+                <a:gs pos="100000">
+                  <a:schemeClr val="accent2"/>
+                </a:gs>
+              </a:gsLst>
+              <a:lin ang="1800000" scaled="0"/>
+            </a:gradFill>
+            <a:ln>
+              <a:noFill/>
+            </a:ln>
+          </p:spPr>
+          <p:style>
+            <a:lnRef idx="2">
+              <a:schemeClr val="accent1">
+                <a:shade val="50000"/>
+              </a:schemeClr>
+            </a:lnRef>
+            <a:fillRef idx="1">
+              <a:schemeClr val="accent1"/>
+            </a:fillRef>
+            <a:effectRef idx="0">
+              <a:schemeClr val="accent1"/>
+            </a:effectRef>
+            <a:fontRef idx="minor">
+              <a:schemeClr val="lt1"/>
+            </a:fontRef>
+          </p:style>
+          <p:txBody>
+            <a:bodyPr rtlCol="0" anchor="ctr"/>
+            <a:lstStyle/>
+            <a:p>
+              <a:pPr algn="ctr"/>
+              <a:endParaRPr lang="en-US"/>
+            </a:p>
+          </p:txBody>
+        </p:sp>
+        <p:sp>
+          <p:nvSpPr>
+            <p:cNvPr id="6153" name="Rectangle 6152">
+              <a:extLst>
+                <a:ext uri="{FF2B5EF4-FFF2-40B4-BE49-F238E27FC236}">
+                  <a16:creationId xmlns:a16="http://schemas.microsoft.com/office/drawing/2014/main" id="{9BD98075-BFC1-BE9C-7FB7-23FE55E43393}"/>
+                </a:ext>
+                <a:ext uri="{C183D7F6-B498-43B3-948B-1728B52AA6E4}">
+                  <adec:decorative xmlns:adec="http://schemas.microsoft.com/office/drawing/2017/decorative" val="1"/>
+                </a:ext>
+              </a:extLst>
+            </p:cNvPr>
+            <p:cNvSpPr/>
+            <p:nvPr>
+              <p:extLst>
+                <p:ext uri="{386F3935-93C4-4BCD-93E2-E3B085C9AB24}">
+                  <p16:designElem xmlns:p16="http://schemas.microsoft.com/office/powerpoint/2015/main" val="1"/>
+                </p:ext>
+              </p:extLst>
+            </p:nvPr>
+          </p:nvSpPr>
+          <p:spPr>
+            <a:xfrm rot="16200000">
+              <a:off x="9176406" y="3835311"/>
+              <a:ext cx="123362" cy="5928176"/>
+            </a:xfrm>
+            <a:prstGeom prst="rect">
+              <a:avLst/>
+            </a:prstGeom>
+            <a:gradFill>
+              <a:gsLst>
+                <a:gs pos="19000">
+                  <a:schemeClr val="accent5">
+                    <a:alpha val="0"/>
+                  </a:schemeClr>
+                </a:gs>
+                <a:gs pos="100000">
+                  <a:schemeClr val="accent5">
+                    <a:lumMod val="60000"/>
+                    <a:lumOff val="40000"/>
+                  </a:schemeClr>
+                </a:gs>
+              </a:gsLst>
+              <a:lin ang="600000" scaled="0"/>
+            </a:gradFill>
+            <a:ln>
+              <a:noFill/>
+            </a:ln>
+          </p:spPr>
+          <p:style>
+            <a:lnRef idx="2">
+              <a:schemeClr val="accent1">
+                <a:shade val="50000"/>
+              </a:schemeClr>
+            </a:lnRef>
+            <a:fillRef idx="1">
+              <a:schemeClr val="accent1"/>
+            </a:fillRef>
+            <a:effectRef idx="0">
+              <a:schemeClr val="accent1"/>
+            </a:effectRef>
+            <a:fontRef idx="minor">
+              <a:schemeClr val="lt1"/>
+            </a:fontRef>
+          </p:style>
+          <p:txBody>
+            <a:bodyPr rtlCol="0" anchor="ctr"/>
+            <a:lstStyle/>
+            <a:p>
+              <a:pPr algn="ctr"/>
+              <a:endParaRPr lang="en-US"/>
+            </a:p>
+          </p:txBody>
+        </p:sp>
+      </p:grpSp>
     </p:spTree>
     <p:extLst>
       <p:ext uri="{BB962C8B-B14F-4D97-AF65-F5344CB8AC3E}">
@@ -7839,13 +8079,12 @@
             </a:pPr>
             <a:r>
               <a:rPr lang="en-US" sz="2400" dirty="0"/>
-              <a:t>GPT-01 (2024)</a:t>
-            </a:r>
-          </a:p>
-          <a:p>
-            <a:pPr>
-              <a:buFont typeface="Arial" panose="020B0604020202020204" pitchFamily="34" charset="0"/>
-              <a:buChar char="•"/>
+              <a:t>And More!</a:t>
+            </a:r>
+          </a:p>
+          <a:p>
+            <a:pPr marL="0" indent="0">
+              <a:buNone/>
             </a:pPr>
             <a:endParaRPr lang="en-US" sz="1700" dirty="0"/>
           </a:p>
@@ -8797,21 +9036,139 @@
           <a:chExt cx="0" cy="0"/>
         </a:xfrm>
       </p:grpSpPr>
-      <p:sp useBgFill="1">
-        <p:nvSpPr>
-          <p:cNvPr id="21" name="Rectangle 20">
+      <p:sp>
+        <p:nvSpPr>
+          <p:cNvPr id="2" name="Title 1"/>
+          <p:cNvSpPr>
+            <a:spLocks noGrp="1"/>
+          </p:cNvSpPr>
+          <p:nvPr>
+            <p:ph type="title"/>
+          </p:nvPr>
+        </p:nvSpPr>
+        <p:spPr>
+          <a:xfrm>
+            <a:off x="657519" y="591762"/>
+            <a:ext cx="3914481" cy="1616203"/>
+          </a:xfrm>
+        </p:spPr>
+        <p:txBody>
+          <a:bodyPr anchor="b">
+            <a:normAutofit/>
+          </a:bodyPr>
+          <a:lstStyle/>
+          <a:p>
+            <a:r>
+              <a:rPr lang="en-US" sz="2800" dirty="0"/>
+              <a:t>Language is hard!</a:t>
+            </a:r>
+          </a:p>
+        </p:txBody>
+      </p:sp>
+      <p:sp>
+        <p:nvSpPr>
+          <p:cNvPr id="3" name="Content Placeholder 2"/>
+          <p:cNvSpPr>
+            <a:spLocks noGrp="1"/>
+          </p:cNvSpPr>
+          <p:nvPr>
+            <p:ph idx="1"/>
+          </p:nvPr>
+        </p:nvSpPr>
+        <p:spPr>
+          <a:xfrm>
+            <a:off x="344686" y="2668777"/>
+            <a:ext cx="4571999" cy="3447832"/>
+          </a:xfrm>
+        </p:spPr>
+        <p:txBody>
+          <a:bodyPr anchor="t">
+            <a:noAutofit/>
+          </a:bodyPr>
+          <a:lstStyle/>
+          <a:p>
+            <a:r>
+              <a:rPr lang="en-US" sz="2400" dirty="0"/>
+              <a:t>“We have already noted that, while we have machine-aided translation of scientific text, we do not have useful machine translation.  Further, there is no immediate or predictable prospect of useful machine translation.”</a:t>
+            </a:r>
+          </a:p>
+          <a:p>
+            <a:pPr lvl="1"/>
+            <a:r>
+              <a:rPr lang="en-US" sz="2400" dirty="0">
+                <a:hlinkClick r:id="rId3"/>
+              </a:rPr>
+              <a:t>John Pierce, Bell Labs </a:t>
+            </a:r>
+            <a:r>
+              <a:rPr lang="en-US" sz="2400" dirty="0"/>
+              <a:t>(1964)</a:t>
+            </a:r>
+          </a:p>
+        </p:txBody>
+      </p:sp>
+      <p:pic>
+        <p:nvPicPr>
+          <p:cNvPr id="1026" name="Picture 2" descr="A person in a suit and tie sitting at a machine&#10;&#10;AI-generated content may be incorrect.">
             <a:extLst>
               <a:ext uri="{FF2B5EF4-FFF2-40B4-BE49-F238E27FC236}">
-                <a16:creationId xmlns:a16="http://schemas.microsoft.com/office/drawing/2014/main" id="{D1D34770-47A8-402C-AF23-2B653F2D88C1}"/>
+                <a16:creationId xmlns:a16="http://schemas.microsoft.com/office/drawing/2014/main" id="{B869A3E2-3C05-25AD-B17D-32060B483A73}"/>
+              </a:ext>
+            </a:extLst>
+          </p:cNvPr>
+          <p:cNvPicPr>
+            <a:picLocks noChangeAspect="1" noChangeArrowheads="1"/>
+          </p:cNvPicPr>
+          <p:nvPr/>
+        </p:nvPicPr>
+        <p:blipFill>
+          <a:blip r:embed="rId4">
+            <a:extLst>
+              <a:ext uri="{28A0092B-C50C-407E-A947-70E740481C1C}">
+                <a14:useLocalDpi xmlns:a14="http://schemas.microsoft.com/office/drawing/2010/main" val="0"/>
+              </a:ext>
+            </a:extLst>
+          </a:blip>
+          <a:srcRect l="36645" r="12445" b="-1"/>
+          <a:stretch>
+            <a:fillRect/>
+          </a:stretch>
+        </p:blipFill>
+        <p:spPr bwMode="auto">
+          <a:xfrm>
+            <a:off x="5261372" y="877413"/>
+            <a:ext cx="3225407" cy="5043096"/>
+          </a:xfrm>
+          <a:prstGeom prst="rect">
+            <a:avLst/>
+          </a:prstGeom>
+          <a:noFill/>
+          <a:extLst>
+            <a:ext uri="{909E8E84-426E-40DD-AFC4-6F175D3DCCD1}">
+              <a14:hiddenFill xmlns:a14="http://schemas.microsoft.com/office/drawing/2010/main">
+                <a:solidFill>
+                  <a:srgbClr val="FFFFFF"/>
+                </a:solidFill>
+              </a14:hiddenFill>
+            </a:ext>
+          </a:extLst>
+        </p:spPr>
+      </p:pic>
+      <p:grpSp>
+        <p:nvGrpSpPr>
+          <p:cNvPr id="1031" name="Group 1030">
+            <a:extLst>
+              <a:ext uri="{FF2B5EF4-FFF2-40B4-BE49-F238E27FC236}">
+                <a16:creationId xmlns:a16="http://schemas.microsoft.com/office/drawing/2014/main" id="{442598CC-934A-7BCD-C691-B2FE74CEDE6E}"/>
               </a:ext>
               <a:ext uri="{C183D7F6-B498-43B3-948B-1728B52AA6E4}">
                 <adec:decorative xmlns:adec="http://schemas.microsoft.com/office/drawing/2017/decorative" val="1"/>
               </a:ext>
             </a:extLst>
           </p:cNvPr>
-          <p:cNvSpPr>
-            <a:spLocks noGrp="1" noRot="1" noChangeAspect="1" noMove="1" noResize="1" noEditPoints="1" noAdjustHandles="1" noChangeArrowheads="1" noChangeShapeType="1" noTextEdit="1"/>
-          </p:cNvSpPr>
+          <p:cNvGrpSpPr>
+            <a:grpSpLocks noGrp="1" noUngrp="1" noRot="1" noChangeAspect="1" noMove="1" noResize="1"/>
+          </p:cNvGrpSpPr>
           <p:nvPr>
             <p:extLst>
               <p:ext uri="{386F3935-93C4-4BCD-93E2-E3B085C9AB24}">
@@ -8819,145 +9176,159 @@
               </p:ext>
             </p:extLst>
           </p:nvPr>
-        </p:nvSpPr>
-        <p:spPr>
+        </p:nvGrpSpPr>
+        <p:grpSpPr>
           <a:xfrm>
-            <a:off x="0" y="0"/>
-            <a:ext cx="9141713" cy="6858000"/>
+            <a:off x="5261371" y="5858828"/>
+            <a:ext cx="3225408" cy="123363"/>
+            <a:chOff x="7015162" y="5858828"/>
+            <a:chExt cx="4300544" cy="123363"/>
           </a:xfrm>
-          <a:prstGeom prst="rect">
-            <a:avLst/>
-          </a:prstGeom>
-          <a:ln>
-            <a:noFill/>
-          </a:ln>
-        </p:spPr>
-        <p:style>
-          <a:lnRef idx="2">
-            <a:schemeClr val="accent1">
-              <a:shade val="50000"/>
-            </a:schemeClr>
-          </a:lnRef>
-          <a:fillRef idx="1">
-            <a:schemeClr val="accent1"/>
-          </a:fillRef>
-          <a:effectRef idx="0">
-            <a:schemeClr val="accent1"/>
-          </a:effectRef>
-          <a:fontRef idx="minor">
-            <a:schemeClr val="lt1"/>
-          </a:fontRef>
-        </p:style>
-        <p:txBody>
-          <a:bodyPr rtlCol="0" anchor="ctr"/>
-          <a:lstStyle/>
-          <a:p>
-            <a:pPr algn="ctr"/>
-            <a:endParaRPr lang="en-US"/>
-          </a:p>
-        </p:txBody>
-      </p:sp>
-      <p:sp>
-        <p:nvSpPr>
-          <p:cNvPr id="2" name="Title 1"/>
-          <p:cNvSpPr>
-            <a:spLocks noGrp="1"/>
-          </p:cNvSpPr>
-          <p:nvPr>
-            <p:ph type="title"/>
-          </p:nvPr>
-        </p:nvSpPr>
-        <p:spPr>
-          <a:xfrm>
-            <a:off x="627509" y="723898"/>
-            <a:ext cx="4501582" cy="1495425"/>
-          </a:xfrm>
-        </p:spPr>
-        <p:txBody>
-          <a:bodyPr>
-            <a:normAutofit/>
-          </a:bodyPr>
-          <a:lstStyle/>
-          <a:p>
-            <a:r>
-              <a:rPr lang="en-US" sz="3500"/>
-              <a:t>Language is hard!</a:t>
-            </a:r>
-          </a:p>
-        </p:txBody>
-      </p:sp>
-      <p:sp>
-        <p:nvSpPr>
-          <p:cNvPr id="3" name="Content Placeholder 2"/>
-          <p:cNvSpPr>
-            <a:spLocks noGrp="1"/>
-          </p:cNvSpPr>
-          <p:nvPr>
-            <p:ph idx="1"/>
-          </p:nvPr>
-        </p:nvSpPr>
-        <p:spPr>
-          <a:xfrm>
-            <a:off x="448999" y="2405067"/>
-            <a:ext cx="4501582" cy="3729034"/>
-          </a:xfrm>
-        </p:spPr>
-        <p:txBody>
-          <a:bodyPr>
-            <a:normAutofit/>
-          </a:bodyPr>
-          <a:lstStyle/>
-          <a:p>
-            <a:r>
-              <a:rPr lang="en-US" sz="2400" dirty="0"/>
-              <a:t>“We have already noted that, while we have machine-aided translation of scientific text, we do not have useful machine translation.  Further, there is no immediate or predictable prospect of useful machine translation.”</a:t>
-            </a:r>
-          </a:p>
-          <a:p>
-            <a:pPr lvl="1"/>
-            <a:r>
-              <a:rPr lang="en-US" sz="2400" dirty="0">
-                <a:hlinkClick r:id="rId3"/>
-              </a:rPr>
-              <a:t>John Pierce, Bell Labs </a:t>
-            </a:r>
-            <a:r>
-              <a:rPr lang="en-US" sz="2400" dirty="0"/>
-              <a:t>(1964)</a:t>
-            </a:r>
-          </a:p>
-        </p:txBody>
-      </p:sp>
-      <p:pic>
-        <p:nvPicPr>
-          <p:cNvPr id="5" name="Picture 4" descr="Empty speech bubbles">
-            <a:extLst>
-              <a:ext uri="{FF2B5EF4-FFF2-40B4-BE49-F238E27FC236}">
-                <a16:creationId xmlns:a16="http://schemas.microsoft.com/office/drawing/2014/main" id="{CA3982D4-185A-4796-578C-E1ACE59417EF}"/>
-              </a:ext>
-            </a:extLst>
-          </p:cNvPr>
-          <p:cNvPicPr>
-            <a:picLocks noChangeAspect="1"/>
-          </p:cNvPicPr>
-          <p:nvPr/>
-        </p:nvPicPr>
-        <p:blipFill rotWithShape="1">
-          <a:blip r:embed="rId4"/>
-          <a:srcRect l="36026" r="27528" b="-1"/>
-          <a:stretch/>
-        </p:blipFill>
-        <p:spPr>
-          <a:xfrm>
-            <a:off x="5399580" y="10"/>
-            <a:ext cx="3744420" cy="6857990"/>
-          </a:xfrm>
-          <a:prstGeom prst="rect">
-            <a:avLst/>
-          </a:prstGeom>
-          <a:effectLst/>
-        </p:spPr>
-      </p:pic>
+        </p:grpSpPr>
+        <p:sp>
+          <p:nvSpPr>
+            <p:cNvPr id="1032" name="Rectangle 1031">
+              <a:extLst>
+                <a:ext uri="{FF2B5EF4-FFF2-40B4-BE49-F238E27FC236}">
+                  <a16:creationId xmlns:a16="http://schemas.microsoft.com/office/drawing/2014/main" id="{AACD0983-348C-E24F-6839-EA2014B9D12F}"/>
+                </a:ext>
+                <a:ext uri="{C183D7F6-B498-43B3-948B-1728B52AA6E4}">
+                  <adec:decorative xmlns:adec="http://schemas.microsoft.com/office/drawing/2017/decorative" val="1"/>
+                </a:ext>
+              </a:extLst>
+            </p:cNvPr>
+            <p:cNvSpPr/>
+            <p:nvPr>
+              <p:extLst>
+                <p:ext uri="{386F3935-93C4-4BCD-93E2-E3B085C9AB24}">
+                  <p16:designElem xmlns:p16="http://schemas.microsoft.com/office/powerpoint/2015/main" val="1"/>
+                </p:ext>
+              </p:extLst>
+            </p:nvPr>
+          </p:nvSpPr>
+          <p:spPr>
+            <a:xfrm rot="16200000">
+              <a:off x="9103753" y="3770237"/>
+              <a:ext cx="123362" cy="4300544"/>
+            </a:xfrm>
+            <a:prstGeom prst="rect">
+              <a:avLst/>
+            </a:prstGeom>
+            <a:gradFill>
+              <a:gsLst>
+                <a:gs pos="0">
+                  <a:schemeClr val="accent2"/>
+                </a:gs>
+                <a:gs pos="100000">
+                  <a:schemeClr val="accent5"/>
+                </a:gs>
+              </a:gsLst>
+              <a:lin ang="1800000" scaled="0"/>
+            </a:gradFill>
+            <a:ln>
+              <a:noFill/>
+            </a:ln>
+          </p:spPr>
+          <p:style>
+            <a:lnRef idx="2">
+              <a:schemeClr val="accent1">
+                <a:shade val="50000"/>
+              </a:schemeClr>
+            </a:lnRef>
+            <a:fillRef idx="1">
+              <a:schemeClr val="accent1"/>
+            </a:fillRef>
+            <a:effectRef idx="0">
+              <a:schemeClr val="accent1"/>
+            </a:effectRef>
+            <a:fontRef idx="minor">
+              <a:schemeClr val="lt1"/>
+            </a:fontRef>
+          </p:style>
+          <p:txBody>
+            <a:bodyPr rtlCol="0" anchor="ctr"/>
+            <a:lstStyle/>
+            <a:p>
+              <a:pPr algn="ctr"/>
+              <a:endParaRPr lang="en-US"/>
+            </a:p>
+          </p:txBody>
+        </p:sp>
+        <p:sp>
+          <p:nvSpPr>
+            <p:cNvPr id="1033" name="Rectangle 1032">
+              <a:extLst>
+                <a:ext uri="{FF2B5EF4-FFF2-40B4-BE49-F238E27FC236}">
+                  <a16:creationId xmlns:a16="http://schemas.microsoft.com/office/drawing/2014/main" id="{E1174876-930F-4902-5A02-274205566241}"/>
+                </a:ext>
+                <a:ext uri="{C183D7F6-B498-43B3-948B-1728B52AA6E4}">
+                  <adec:decorative xmlns:adec="http://schemas.microsoft.com/office/drawing/2017/decorative" val="1"/>
+                </a:ext>
+              </a:extLst>
+            </p:cNvPr>
+            <p:cNvSpPr/>
+            <p:nvPr>
+              <p:extLst>
+                <p:ext uri="{386F3935-93C4-4BCD-93E2-E3B085C9AB24}">
+                  <p16:designElem xmlns:p16="http://schemas.microsoft.com/office/powerpoint/2015/main" val="1"/>
+                </p:ext>
+              </p:extLst>
+            </p:nvPr>
+          </p:nvSpPr>
+          <p:spPr>
+            <a:xfrm rot="16200000">
+              <a:off x="10209789" y="4876274"/>
+              <a:ext cx="123362" cy="2088471"/>
+            </a:xfrm>
+            <a:prstGeom prst="rect">
+              <a:avLst/>
+            </a:prstGeom>
+            <a:gradFill>
+              <a:gsLst>
+                <a:gs pos="19000">
+                  <a:schemeClr val="accent5">
+                    <a:alpha val="0"/>
+                  </a:schemeClr>
+                </a:gs>
+                <a:gs pos="100000">
+                  <a:schemeClr val="accent5">
+                    <a:lumMod val="60000"/>
+                    <a:lumOff val="40000"/>
+                  </a:schemeClr>
+                </a:gs>
+              </a:gsLst>
+              <a:lin ang="600000" scaled="0"/>
+            </a:gradFill>
+            <a:ln>
+              <a:noFill/>
+            </a:ln>
+          </p:spPr>
+          <p:style>
+            <a:lnRef idx="2">
+              <a:schemeClr val="accent1">
+                <a:shade val="50000"/>
+              </a:schemeClr>
+            </a:lnRef>
+            <a:fillRef idx="1">
+              <a:schemeClr val="accent1"/>
+            </a:fillRef>
+            <a:effectRef idx="0">
+              <a:schemeClr val="accent1"/>
+            </a:effectRef>
+            <a:fontRef idx="minor">
+              <a:schemeClr val="lt1"/>
+            </a:fontRef>
+          </p:style>
+          <p:txBody>
+            <a:bodyPr rtlCol="0" anchor="ctr"/>
+            <a:lstStyle/>
+            <a:p>
+              <a:pPr algn="ctr"/>
+              <a:endParaRPr lang="en-US"/>
+            </a:p>
+          </p:txBody>
+        </p:sp>
+      </p:grpSp>
     </p:spTree>
   </p:cSld>
   <p:clrMapOvr>
@@ -9659,21 +10030,155 @@
           <a:chExt cx="0" cy="0"/>
         </a:xfrm>
       </p:grpSpPr>
-      <p:sp useBgFill="1">
-        <p:nvSpPr>
-          <p:cNvPr id="16" name="Slide Background">
+      <p:sp>
+        <p:nvSpPr>
+          <p:cNvPr id="2" name="Title 1"/>
+          <p:cNvSpPr>
+            <a:spLocks noGrp="1"/>
+          </p:cNvSpPr>
+          <p:nvPr>
+            <p:ph type="title"/>
+          </p:nvPr>
+        </p:nvSpPr>
+        <p:spPr>
+          <a:xfrm>
+            <a:off x="408137" y="458758"/>
+            <a:ext cx="2591866" cy="1616203"/>
+          </a:xfrm>
+        </p:spPr>
+        <p:txBody>
+          <a:bodyPr anchor="b">
+            <a:normAutofit/>
+          </a:bodyPr>
+          <a:lstStyle/>
+          <a:p>
+            <a:r>
+              <a:rPr lang="en-US" sz="2800" dirty="0"/>
+              <a:t>The Emergence of Machine Learning</a:t>
+            </a:r>
+          </a:p>
+        </p:txBody>
+      </p:sp>
+      <p:sp>
+        <p:nvSpPr>
+          <p:cNvPr id="3" name="Content Placeholder 2"/>
+          <p:cNvSpPr>
+            <a:spLocks noGrp="1"/>
+          </p:cNvSpPr>
+          <p:nvPr>
+            <p:ph idx="1"/>
+          </p:nvPr>
+        </p:nvSpPr>
+        <p:spPr>
+          <a:xfrm>
+            <a:off x="258507" y="2463273"/>
+            <a:ext cx="3781477" cy="3447832"/>
+          </a:xfrm>
+        </p:spPr>
+        <p:txBody>
+          <a:bodyPr anchor="t">
+            <a:noAutofit/>
+          </a:bodyPr>
+          <a:lstStyle/>
+          <a:p>
+            <a:r>
+              <a:rPr lang="en-US" sz="2000" dirty="0">
+                <a:hlinkClick r:id="rId3"/>
+              </a:rPr>
+              <a:t>Perceptron</a:t>
+            </a:r>
+            <a:r>
+              <a:rPr lang="en-US" sz="2000" dirty="0"/>
+              <a:t> (1943, 1957) by </a:t>
+            </a:r>
+            <a:r>
+              <a:rPr lang="en-US" sz="2000" dirty="0" err="1"/>
+              <a:t>McCulloch&amp;Pitts,Rosenblatt</a:t>
+            </a:r>
+            <a:endParaRPr lang="en-US" sz="2000" dirty="0"/>
+          </a:p>
+          <a:p>
+            <a:pPr lvl="1"/>
+            <a:r>
+              <a:rPr lang="en-US" sz="2000" dirty="0"/>
+              <a:t>Based on understanding of the human brain</a:t>
+            </a:r>
+          </a:p>
+          <a:p>
+            <a:r>
+              <a:rPr lang="en-US" sz="2000" dirty="0">
+                <a:hlinkClick r:id="rId4"/>
+              </a:rPr>
+              <a:t>Backpropagation algorithm </a:t>
+            </a:r>
+            <a:r>
+              <a:rPr lang="en-US" sz="2000" dirty="0"/>
+              <a:t>(1986) by Rumelhart, Hinton, and Williams</a:t>
+            </a:r>
+          </a:p>
+        </p:txBody>
+      </p:sp>
+      <p:pic>
+        <p:nvPicPr>
+          <p:cNvPr id="2050" name="Picture 2">
             <a:extLst>
               <a:ext uri="{FF2B5EF4-FFF2-40B4-BE49-F238E27FC236}">
-                <a16:creationId xmlns:a16="http://schemas.microsoft.com/office/drawing/2014/main" id="{9F7D5CDA-D291-4307-BF55-1381FED29634}"/>
+                <a16:creationId xmlns:a16="http://schemas.microsoft.com/office/drawing/2014/main" id="{70E93C1E-2903-1BC3-114D-EE58F746AFA6}"/>
+              </a:ext>
+            </a:extLst>
+          </p:cNvPr>
+          <p:cNvPicPr>
+            <a:picLocks noChangeAspect="1" noChangeArrowheads="1"/>
+          </p:cNvPicPr>
+          <p:nvPr/>
+        </p:nvPicPr>
+        <p:blipFill>
+          <a:blip r:embed="rId5">
+            <a:extLst>
+              <a:ext uri="{28A0092B-C50C-407E-A947-70E740481C1C}">
+                <a14:useLocalDpi xmlns:a14="http://schemas.microsoft.com/office/drawing/2010/main" val="0"/>
+              </a:ext>
+            </a:extLst>
+          </a:blip>
+          <a:stretch>
+            <a:fillRect/>
+          </a:stretch>
+        </p:blipFill>
+        <p:spPr bwMode="auto">
+          <a:xfrm>
+            <a:off x="3424871" y="2306935"/>
+            <a:ext cx="5719129" cy="2441236"/>
+          </a:xfrm>
+          <a:prstGeom prst="rect">
+            <a:avLst/>
+          </a:prstGeom>
+          <a:noFill/>
+          <a:extLst>
+            <a:ext uri="{909E8E84-426E-40DD-AFC4-6F175D3DCCD1}">
+              <a14:hiddenFill xmlns:a14="http://schemas.microsoft.com/office/drawing/2010/main">
+                <a:solidFill>
+                  <a:srgbClr val="FFFFFF"/>
+                </a:solidFill>
+              </a14:hiddenFill>
+            </a:ext>
+          </a:extLst>
+        </p:spPr>
+      </p:pic>
+      <p:grpSp>
+        <p:nvGrpSpPr>
+          <p:cNvPr id="2055" name="Group 2054">
+            <a:extLst>
+              <a:ext uri="{FF2B5EF4-FFF2-40B4-BE49-F238E27FC236}">
+                <a16:creationId xmlns:a16="http://schemas.microsoft.com/office/drawing/2014/main" id="{6258F736-B256-8039-9DC6-F4E49A5C5AD5}"/>
               </a:ext>
               <a:ext uri="{C183D7F6-B498-43B3-948B-1728B52AA6E4}">
                 <adec:decorative xmlns:adec="http://schemas.microsoft.com/office/drawing/2017/decorative" val="1"/>
               </a:ext>
             </a:extLst>
           </p:cNvPr>
-          <p:cNvSpPr>
-            <a:spLocks noGrp="1" noRot="1" noChangeAspect="1" noMove="1" noResize="1" noEditPoints="1" noAdjustHandles="1" noChangeArrowheads="1" noChangeShapeType="1" noTextEdit="1"/>
-          </p:cNvSpPr>
+          <p:cNvGrpSpPr>
+            <a:grpSpLocks noGrp="1" noUngrp="1" noRot="1" noChangeAspect="1" noMove="1" noResize="1"/>
+          </p:cNvGrpSpPr>
           <p:nvPr>
             <p:extLst>
               <p:ext uri="{386F3935-93C4-4BCD-93E2-E3B085C9AB24}">
@@ -9681,176 +10186,161 @@
               </p:ext>
             </p:extLst>
           </p:nvPr>
-        </p:nvSpPr>
-        <p:spPr>
-          <a:xfrm>
-            <a:off x="0" y="0"/>
-            <a:ext cx="9144000" cy="6858000"/>
+        </p:nvGrpSpPr>
+        <p:grpSpPr>
+          <a:xfrm flipH="1">
+            <a:off x="9051478" y="0"/>
+            <a:ext cx="92522" cy="6858000"/>
+            <a:chOff x="12068638" y="0"/>
+            <a:chExt cx="123362" cy="6858000"/>
           </a:xfrm>
-          <a:prstGeom prst="rect">
-            <a:avLst/>
-          </a:prstGeom>
-          <a:ln>
-            <a:noFill/>
-          </a:ln>
-        </p:spPr>
-        <p:style>
-          <a:lnRef idx="2">
-            <a:schemeClr val="accent1">
-              <a:shade val="50000"/>
-            </a:schemeClr>
-          </a:lnRef>
-          <a:fillRef idx="1">
-            <a:schemeClr val="accent1"/>
-          </a:fillRef>
-          <a:effectRef idx="0">
-            <a:schemeClr val="accent1"/>
-          </a:effectRef>
-          <a:fontRef idx="minor">
-            <a:schemeClr val="lt1"/>
-          </a:fontRef>
-        </p:style>
-        <p:txBody>
-          <a:bodyPr rtlCol="0" anchor="ctr"/>
-          <a:lstStyle/>
-          <a:p>
-            <a:pPr algn="ctr"/>
-            <a:endParaRPr lang="en-US"/>
-          </a:p>
-        </p:txBody>
-      </p:sp>
-      <p:sp>
-        <p:nvSpPr>
-          <p:cNvPr id="2" name="Title 1"/>
-          <p:cNvSpPr>
-            <a:spLocks noGrp="1"/>
-          </p:cNvSpPr>
-          <p:nvPr>
-            <p:ph type="title"/>
-          </p:nvPr>
-        </p:nvSpPr>
-        <p:spPr>
-          <a:xfrm>
-            <a:off x="571350" y="762001"/>
-            <a:ext cx="4000647" cy="1708242"/>
-          </a:xfrm>
-        </p:spPr>
-        <p:txBody>
-          <a:bodyPr anchor="ctr">
-            <a:normAutofit/>
-          </a:bodyPr>
-          <a:lstStyle/>
-          <a:p>
-            <a:r>
-              <a:rPr lang="en-US" sz="3500"/>
-              <a:t>The Emergence of Machine Learning</a:t>
-            </a:r>
-          </a:p>
-        </p:txBody>
-      </p:sp>
-      <p:sp>
-        <p:nvSpPr>
-          <p:cNvPr id="3" name="Content Placeholder 2"/>
-          <p:cNvSpPr>
-            <a:spLocks noGrp="1"/>
-          </p:cNvSpPr>
-          <p:nvPr>
-            <p:ph idx="1"/>
-          </p:nvPr>
-        </p:nvSpPr>
-        <p:spPr>
-          <a:xfrm>
-            <a:off x="143124" y="2470244"/>
-            <a:ext cx="4675366" cy="3769835"/>
-          </a:xfrm>
-        </p:spPr>
-        <p:txBody>
-          <a:bodyPr anchor="ctr">
-            <a:normAutofit/>
-          </a:bodyPr>
-          <a:lstStyle/>
-          <a:p>
-            <a:r>
-              <a:rPr lang="en-US" sz="2400" dirty="0">
-                <a:hlinkClick r:id="rId3"/>
-              </a:rPr>
-              <a:t>Perceptron</a:t>
-            </a:r>
-            <a:r>
-              <a:rPr lang="en-US" sz="2400" dirty="0"/>
-              <a:t> (1943, 1957) by </a:t>
-            </a:r>
-            <a:r>
-              <a:rPr lang="en-US" sz="2400" dirty="0" err="1"/>
-              <a:t>McCulloch&amp;Pitts,Rosenblatt</a:t>
-            </a:r>
-            <a:endParaRPr lang="en-US" sz="2400" dirty="0"/>
-          </a:p>
-          <a:p>
-            <a:pPr lvl="1"/>
-            <a:r>
-              <a:rPr lang="en-US" sz="2400" dirty="0"/>
-              <a:t>Based on understanding of the human brain</a:t>
-            </a:r>
-          </a:p>
-          <a:p>
-            <a:r>
-              <a:rPr lang="en-US" sz="2400" dirty="0">
-                <a:hlinkClick r:id="rId4"/>
-              </a:rPr>
-              <a:t>Backpropagation algorithm </a:t>
-            </a:r>
-            <a:r>
-              <a:rPr lang="en-US" sz="2400" dirty="0"/>
-              <a:t>(1986) by </a:t>
-            </a:r>
-            <a:r>
-              <a:rPr lang="en-US" sz="2400" dirty="0" err="1"/>
-              <a:t>Rumelhart</a:t>
-            </a:r>
-            <a:r>
-              <a:rPr lang="en-US" sz="2400" dirty="0"/>
-              <a:t>, Hinton, and Williams</a:t>
-            </a:r>
-          </a:p>
-        </p:txBody>
-      </p:sp>
-      <p:pic>
-        <p:nvPicPr>
-          <p:cNvPr id="5" name="Picture 4" descr="Close-up of a calculator keypad">
-            <a:extLst>
-              <a:ext uri="{FF2B5EF4-FFF2-40B4-BE49-F238E27FC236}">
-                <a16:creationId xmlns:a16="http://schemas.microsoft.com/office/drawing/2014/main" id="{F1546CC3-C4C5-79B9-5EAD-C030A8E0360E}"/>
-              </a:ext>
-            </a:extLst>
-          </p:cNvPr>
-          <p:cNvPicPr>
-            <a:picLocks noChangeAspect="1"/>
-          </p:cNvPicPr>
-          <p:nvPr/>
-        </p:nvPicPr>
-        <p:blipFill rotWithShape="1">
-          <a:blip r:embed="rId5"/>
-          <a:srcRect l="27390" r="34024" b="-1"/>
-          <a:stretch/>
-        </p:blipFill>
-        <p:spPr>
-          <a:xfrm>
-            <a:off x="5143347" y="-10886"/>
-            <a:ext cx="4000653" cy="6868886"/>
-          </a:xfrm>
-          <a:prstGeom prst="rect">
-            <a:avLst/>
-          </a:prstGeom>
-          <a:effectLst>
-            <a:outerShdw blurRad="127000" dist="50800" dir="10800000" sx="99000" sy="99000" algn="r" rotWithShape="0">
-              <a:prstClr val="black">
-                <a:alpha val="40000"/>
-              </a:prstClr>
-            </a:outerShdw>
-          </a:effectLst>
-        </p:spPr>
-      </p:pic>
+        </p:grpSpPr>
+        <p:sp>
+          <p:nvSpPr>
+            <p:cNvPr id="2056" name="Rectangle 2055">
+              <a:extLst>
+                <a:ext uri="{FF2B5EF4-FFF2-40B4-BE49-F238E27FC236}">
+                  <a16:creationId xmlns:a16="http://schemas.microsoft.com/office/drawing/2014/main" id="{10B4520A-996E-330C-99DA-69CA4D89E906}"/>
+                </a:ext>
+                <a:ext uri="{C183D7F6-B498-43B3-948B-1728B52AA6E4}">
+                  <adec:decorative xmlns:adec="http://schemas.microsoft.com/office/drawing/2017/decorative" val="1"/>
+                </a:ext>
+              </a:extLst>
+            </p:cNvPr>
+            <p:cNvSpPr/>
+            <p:nvPr>
+              <p:extLst>
+                <p:ext uri="{386F3935-93C4-4BCD-93E2-E3B085C9AB24}">
+                  <p16:designElem xmlns:p16="http://schemas.microsoft.com/office/powerpoint/2015/main" val="1"/>
+                </p:ext>
+              </p:extLst>
+            </p:nvPr>
+          </p:nvSpPr>
+          <p:spPr>
+            <a:xfrm>
+              <a:off x="12068638" y="0"/>
+              <a:ext cx="123362" cy="6858000"/>
+            </a:xfrm>
+            <a:prstGeom prst="rect">
+              <a:avLst/>
+            </a:prstGeom>
+            <a:gradFill>
+              <a:gsLst>
+                <a:gs pos="0">
+                  <a:schemeClr val="accent2"/>
+                </a:gs>
+                <a:gs pos="100000">
+                  <a:schemeClr val="accent5"/>
+                </a:gs>
+              </a:gsLst>
+              <a:lin ang="1800000" scaled="0"/>
+            </a:gradFill>
+            <a:ln>
+              <a:noFill/>
+            </a:ln>
+          </p:spPr>
+          <p:style>
+            <a:lnRef idx="2">
+              <a:schemeClr val="accent1">
+                <a:shade val="50000"/>
+              </a:schemeClr>
+            </a:lnRef>
+            <a:fillRef idx="1">
+              <a:schemeClr val="accent1"/>
+            </a:fillRef>
+            <a:effectRef idx="0">
+              <a:schemeClr val="accent1"/>
+            </a:effectRef>
+            <a:fontRef idx="minor">
+              <a:schemeClr val="lt1"/>
+            </a:fontRef>
+          </p:style>
+          <p:txBody>
+            <a:bodyPr rtlCol="0" anchor="ctr"/>
+            <a:lstStyle/>
+            <a:p>
+              <a:pPr algn="ctr"/>
+              <a:endParaRPr lang="en-US"/>
+            </a:p>
+          </p:txBody>
+        </p:sp>
+        <p:sp>
+          <p:nvSpPr>
+            <p:cNvPr id="2057" name="Rectangle 2056">
+              <a:extLst>
+                <a:ext uri="{FF2B5EF4-FFF2-40B4-BE49-F238E27FC236}">
+                  <a16:creationId xmlns:a16="http://schemas.microsoft.com/office/drawing/2014/main" id="{EC8FA945-E356-695F-18D6-CAD4EF34FE4A}"/>
+                </a:ext>
+                <a:ext uri="{C183D7F6-B498-43B3-948B-1728B52AA6E4}">
+                  <adec:decorative xmlns:adec="http://schemas.microsoft.com/office/drawing/2017/decorative" val="1"/>
+                </a:ext>
+              </a:extLst>
+            </p:cNvPr>
+            <p:cNvSpPr/>
+            <p:nvPr>
+              <p:extLst>
+                <p:ext uri="{386F3935-93C4-4BCD-93E2-E3B085C9AB24}">
+                  <p16:designElem xmlns:p16="http://schemas.microsoft.com/office/powerpoint/2015/main" val="1"/>
+                </p:ext>
+              </p:extLst>
+            </p:nvPr>
+          </p:nvSpPr>
+          <p:spPr>
+            <a:xfrm>
+              <a:off x="12068638" y="3527553"/>
+              <a:ext cx="123362" cy="3330447"/>
+            </a:xfrm>
+            <a:prstGeom prst="rect">
+              <a:avLst/>
+            </a:prstGeom>
+            <a:gradFill>
+              <a:gsLst>
+                <a:gs pos="19000">
+                  <a:schemeClr val="accent5">
+                    <a:lumMod val="60000"/>
+                    <a:lumOff val="40000"/>
+                    <a:alpha val="0"/>
+                  </a:schemeClr>
+                </a:gs>
+                <a:gs pos="100000">
+                  <a:schemeClr val="accent5">
+                    <a:lumMod val="60000"/>
+                    <a:lumOff val="40000"/>
+                  </a:schemeClr>
+                </a:gs>
+              </a:gsLst>
+              <a:lin ang="600000" scaled="0"/>
+            </a:gradFill>
+            <a:ln>
+              <a:noFill/>
+            </a:ln>
+          </p:spPr>
+          <p:style>
+            <a:lnRef idx="2">
+              <a:schemeClr val="accent1">
+                <a:shade val="50000"/>
+              </a:schemeClr>
+            </a:lnRef>
+            <a:fillRef idx="1">
+              <a:schemeClr val="accent1"/>
+            </a:fillRef>
+            <a:effectRef idx="0">
+              <a:schemeClr val="accent1"/>
+            </a:effectRef>
+            <a:fontRef idx="minor">
+              <a:schemeClr val="lt1"/>
+            </a:fontRef>
+          </p:style>
+          <p:txBody>
+            <a:bodyPr rtlCol="0" anchor="ctr"/>
+            <a:lstStyle/>
+            <a:p>
+              <a:pPr algn="ctr"/>
+              <a:endParaRPr lang="en-US"/>
+            </a:p>
+          </p:txBody>
+        </p:sp>
+      </p:grpSp>
     </p:spTree>
   </p:cSld>
   <p:clrMapOvr>
@@ -9884,21 +10374,149 @@
           <a:chExt cx="0" cy="0"/>
         </a:xfrm>
       </p:grpSpPr>
-      <p:sp useBgFill="1">
-        <p:nvSpPr>
-          <p:cNvPr id="9" name="Slide Background">
+      <p:sp>
+        <p:nvSpPr>
+          <p:cNvPr id="2" name="Title 1"/>
+          <p:cNvSpPr>
+            <a:spLocks noGrp="1"/>
+          </p:cNvSpPr>
+          <p:nvPr>
+            <p:ph type="title"/>
+          </p:nvPr>
+        </p:nvSpPr>
+        <p:spPr>
+          <a:xfrm>
+            <a:off x="620692" y="463709"/>
+            <a:ext cx="2591866" cy="1616203"/>
+          </a:xfrm>
+        </p:spPr>
+        <p:txBody>
+          <a:bodyPr anchor="b">
+            <a:normAutofit/>
+          </a:bodyPr>
+          <a:lstStyle/>
+          <a:p>
+            <a:r>
+              <a:rPr lang="en-US" sz="2800" dirty="0"/>
+              <a:t>Samuel's Checkers Program (1952)</a:t>
+            </a:r>
+          </a:p>
+        </p:txBody>
+      </p:sp>
+      <p:sp>
+        <p:nvSpPr>
+          <p:cNvPr id="3" name="Content Placeholder 2"/>
+          <p:cNvSpPr>
+            <a:spLocks noGrp="1"/>
+          </p:cNvSpPr>
+          <p:nvPr>
+            <p:ph idx="1"/>
+          </p:nvPr>
+        </p:nvSpPr>
+        <p:spPr>
+          <a:xfrm>
+            <a:off x="375155" y="2533476"/>
+            <a:ext cx="3082940" cy="3447832"/>
+          </a:xfrm>
+        </p:spPr>
+        <p:txBody>
+          <a:bodyPr anchor="t">
+            <a:noAutofit/>
+          </a:bodyPr>
+          <a:lstStyle/>
+          <a:p>
+            <a:r>
+              <a:rPr lang="en-US" sz="2400" dirty="0">
+                <a:hlinkClick r:id="rId3"/>
+              </a:rPr>
+              <a:t>One of the first self-learning programs</a:t>
+            </a:r>
+            <a:endParaRPr lang="en-US" sz="2400" dirty="0"/>
+          </a:p>
+          <a:p>
+            <a:pPr lvl="1"/>
+            <a:r>
+              <a:rPr lang="en-US" sz="2400" dirty="0"/>
+              <a:t>Arthur Samuel (1952)</a:t>
+            </a:r>
+          </a:p>
+          <a:p>
+            <a:pPr lvl="1"/>
+            <a:r>
+              <a:rPr lang="en-US" sz="2400" dirty="0"/>
+              <a:t>Used heuristic search and reinforcement learning</a:t>
+            </a:r>
+          </a:p>
+          <a:p>
+            <a:pPr lvl="1"/>
+            <a:r>
+              <a:rPr lang="en-US" sz="2400" dirty="0"/>
+              <a:t>Could beat a human player</a:t>
+            </a:r>
+          </a:p>
+        </p:txBody>
+      </p:sp>
+      <p:pic>
+        <p:nvPicPr>
+          <p:cNvPr id="3074" name="Picture 2" descr="On Thinking Machines, Machine Learning, And How AI Took Over Statistics">
             <a:extLst>
               <a:ext uri="{FF2B5EF4-FFF2-40B4-BE49-F238E27FC236}">
-                <a16:creationId xmlns:a16="http://schemas.microsoft.com/office/drawing/2014/main" id="{C0763A76-9F1C-4FC5-82B7-DD475DA461B2}"/>
+                <a16:creationId xmlns:a16="http://schemas.microsoft.com/office/drawing/2014/main" id="{0D6174D5-D427-E13C-989C-572CD49607B3}"/>
+              </a:ext>
+            </a:extLst>
+          </p:cNvPr>
+          <p:cNvPicPr>
+            <a:picLocks noChangeAspect="1" noChangeArrowheads="1"/>
+          </p:cNvPicPr>
+          <p:nvPr/>
+        </p:nvPicPr>
+        <p:blipFill>
+          <a:blip r:embed="rId4">
+            <a:extLst>
+              <a:ext uri="{28A0092B-C50C-407E-A947-70E740481C1C}">
+                <a14:useLocalDpi xmlns:a14="http://schemas.microsoft.com/office/drawing/2010/main" val="0"/>
+              </a:ext>
+            </a:extLst>
+          </a:blip>
+          <a:stretch>
+            <a:fillRect/>
+          </a:stretch>
+        </p:blipFill>
+        <p:spPr bwMode="auto">
+          <a:xfrm>
+            <a:off x="3740754" y="2079912"/>
+            <a:ext cx="4792009" cy="2707485"/>
+          </a:xfrm>
+          <a:prstGeom prst="rect">
+            <a:avLst/>
+          </a:prstGeom>
+          <a:noFill/>
+          <a:extLst>
+            <a:ext uri="{909E8E84-426E-40DD-AFC4-6F175D3DCCD1}">
+              <a14:hiddenFill xmlns:a14="http://schemas.microsoft.com/office/drawing/2010/main">
+                <a:solidFill>
+                  <a:srgbClr val="FFFFFF"/>
+                </a:solidFill>
+              </a14:hiddenFill>
+            </a:ext>
+          </a:extLst>
+        </p:spPr>
+      </p:pic>
+      <p:grpSp>
+        <p:nvGrpSpPr>
+          <p:cNvPr id="3079" name="Group 3078">
+            <a:extLst>
+              <a:ext uri="{FF2B5EF4-FFF2-40B4-BE49-F238E27FC236}">
+                <a16:creationId xmlns:a16="http://schemas.microsoft.com/office/drawing/2014/main" id="{6258F736-B256-8039-9DC6-F4E49A5C5AD5}"/>
               </a:ext>
               <a:ext uri="{C183D7F6-B498-43B3-948B-1728B52AA6E4}">
                 <adec:decorative xmlns:adec="http://schemas.microsoft.com/office/drawing/2017/decorative" val="1"/>
               </a:ext>
             </a:extLst>
           </p:cNvPr>
-          <p:cNvSpPr>
-            <a:spLocks noGrp="1" noRot="1" noChangeAspect="1" noMove="1" noResize="1" noEditPoints="1" noAdjustHandles="1" noChangeArrowheads="1" noChangeShapeType="1" noTextEdit="1"/>
-          </p:cNvSpPr>
+          <p:cNvGrpSpPr>
+            <a:grpSpLocks noGrp="1" noUngrp="1" noRot="1" noChangeAspect="1" noMove="1" noResize="1"/>
+          </p:cNvGrpSpPr>
           <p:nvPr>
             <p:extLst>
               <p:ext uri="{386F3935-93C4-4BCD-93E2-E3B085C9AB24}">
@@ -9906,316 +10524,161 @@
               </p:ext>
             </p:extLst>
           </p:nvPr>
-        </p:nvSpPr>
-        <p:spPr bwMode="white">
-          <a:xfrm>
-            <a:off x="0" y="0"/>
-            <a:ext cx="9143998" cy="6858000"/>
+        </p:nvGrpSpPr>
+        <p:grpSpPr>
+          <a:xfrm flipH="1">
+            <a:off x="9051478" y="0"/>
+            <a:ext cx="92522" cy="6858000"/>
+            <a:chOff x="12068638" y="0"/>
+            <a:chExt cx="123362" cy="6858000"/>
           </a:xfrm>
-          <a:prstGeom prst="rect">
-            <a:avLst/>
-          </a:prstGeom>
-          <a:ln>
-            <a:noFill/>
-          </a:ln>
-        </p:spPr>
-        <p:style>
-          <a:lnRef idx="2">
-            <a:schemeClr val="accent1">
-              <a:shade val="50000"/>
-            </a:schemeClr>
-          </a:lnRef>
-          <a:fillRef idx="1">
-            <a:schemeClr val="accent1"/>
-          </a:fillRef>
-          <a:effectRef idx="0">
-            <a:schemeClr val="accent1"/>
-          </a:effectRef>
-          <a:fontRef idx="minor">
-            <a:schemeClr val="lt1"/>
-          </a:fontRef>
-        </p:style>
-        <p:txBody>
-          <a:bodyPr rtlCol="0" anchor="ctr"/>
-          <a:lstStyle>
-            <a:defPPr>
-              <a:defRPr lang="en-US"/>
-            </a:defPPr>
-            <a:lvl1pPr marL="0" algn="l" defTabSz="914400" rtl="0" eaLnBrk="1" latinLnBrk="0" hangingPunct="1">
-              <a:defRPr sz="1800" kern="1200">
-                <a:solidFill>
-                  <a:schemeClr val="lt1"/>
-                </a:solidFill>
-                <a:latin typeface="+mn-lt"/>
-                <a:ea typeface="+mn-ea"/>
-                <a:cs typeface="+mn-cs"/>
-              </a:defRPr>
-            </a:lvl1pPr>
-            <a:lvl2pPr marL="457200" algn="l" defTabSz="914400" rtl="0" eaLnBrk="1" latinLnBrk="0" hangingPunct="1">
-              <a:defRPr sz="1800" kern="1200">
-                <a:solidFill>
-                  <a:schemeClr val="lt1"/>
-                </a:solidFill>
-                <a:latin typeface="+mn-lt"/>
-                <a:ea typeface="+mn-ea"/>
-                <a:cs typeface="+mn-cs"/>
-              </a:defRPr>
-            </a:lvl2pPr>
-            <a:lvl3pPr marL="914400" algn="l" defTabSz="914400" rtl="0" eaLnBrk="1" latinLnBrk="0" hangingPunct="1">
-              <a:defRPr sz="1800" kern="1200">
-                <a:solidFill>
-                  <a:schemeClr val="lt1"/>
-                </a:solidFill>
-                <a:latin typeface="+mn-lt"/>
-                <a:ea typeface="+mn-ea"/>
-                <a:cs typeface="+mn-cs"/>
-              </a:defRPr>
-            </a:lvl3pPr>
-            <a:lvl4pPr marL="1371600" algn="l" defTabSz="914400" rtl="0" eaLnBrk="1" latinLnBrk="0" hangingPunct="1">
-              <a:defRPr sz="1800" kern="1200">
-                <a:solidFill>
-                  <a:schemeClr val="lt1"/>
-                </a:solidFill>
-                <a:latin typeface="+mn-lt"/>
-                <a:ea typeface="+mn-ea"/>
-                <a:cs typeface="+mn-cs"/>
-              </a:defRPr>
-            </a:lvl4pPr>
-            <a:lvl5pPr marL="1828800" algn="l" defTabSz="914400" rtl="0" eaLnBrk="1" latinLnBrk="0" hangingPunct="1">
-              <a:defRPr sz="1800" kern="1200">
-                <a:solidFill>
-                  <a:schemeClr val="lt1"/>
-                </a:solidFill>
-                <a:latin typeface="+mn-lt"/>
-                <a:ea typeface="+mn-ea"/>
-                <a:cs typeface="+mn-cs"/>
-              </a:defRPr>
-            </a:lvl5pPr>
-            <a:lvl6pPr marL="2286000" algn="l" defTabSz="914400" rtl="0" eaLnBrk="1" latinLnBrk="0" hangingPunct="1">
-              <a:defRPr sz="1800" kern="1200">
-                <a:solidFill>
-                  <a:schemeClr val="lt1"/>
-                </a:solidFill>
-                <a:latin typeface="+mn-lt"/>
-                <a:ea typeface="+mn-ea"/>
-                <a:cs typeface="+mn-cs"/>
-              </a:defRPr>
-            </a:lvl6pPr>
-            <a:lvl7pPr marL="2743200" algn="l" defTabSz="914400" rtl="0" eaLnBrk="1" latinLnBrk="0" hangingPunct="1">
-              <a:defRPr sz="1800" kern="1200">
-                <a:solidFill>
-                  <a:schemeClr val="lt1"/>
-                </a:solidFill>
-                <a:latin typeface="+mn-lt"/>
-                <a:ea typeface="+mn-ea"/>
-                <a:cs typeface="+mn-cs"/>
-              </a:defRPr>
-            </a:lvl7pPr>
-            <a:lvl8pPr marL="3200400" algn="l" defTabSz="914400" rtl="0" eaLnBrk="1" latinLnBrk="0" hangingPunct="1">
-              <a:defRPr sz="1800" kern="1200">
-                <a:solidFill>
-                  <a:schemeClr val="lt1"/>
-                </a:solidFill>
-                <a:latin typeface="+mn-lt"/>
-                <a:ea typeface="+mn-ea"/>
-                <a:cs typeface="+mn-cs"/>
-              </a:defRPr>
-            </a:lvl8pPr>
-            <a:lvl9pPr marL="3657600" algn="l" defTabSz="914400" rtl="0" eaLnBrk="1" latinLnBrk="0" hangingPunct="1">
-              <a:defRPr sz="1800" kern="1200">
-                <a:solidFill>
-                  <a:schemeClr val="lt1"/>
-                </a:solidFill>
-                <a:latin typeface="+mn-lt"/>
-                <a:ea typeface="+mn-ea"/>
-                <a:cs typeface="+mn-cs"/>
-              </a:defRPr>
-            </a:lvl9pPr>
-          </a:lstStyle>
-          <a:p>
-            <a:pPr algn="ctr"/>
-            <a:endParaRPr lang="en-US"/>
-          </a:p>
-        </p:txBody>
-      </p:sp>
-      <p:sp useBgFill="1">
-        <p:nvSpPr>
-          <p:cNvPr id="11" name="Rectangle 10">
-            <a:extLst>
-              <a:ext uri="{FF2B5EF4-FFF2-40B4-BE49-F238E27FC236}">
-                <a16:creationId xmlns:a16="http://schemas.microsoft.com/office/drawing/2014/main" id="{E81BF4F6-F2CF-4984-9D14-D6966D92F99F}"/>
-              </a:ext>
-              <a:ext uri="{C183D7F6-B498-43B3-948B-1728B52AA6E4}">
-                <adec:decorative xmlns:adec="http://schemas.microsoft.com/office/drawing/2017/decorative" val="1"/>
-              </a:ext>
-            </a:extLst>
-          </p:cNvPr>
-          <p:cNvSpPr>
-            <a:spLocks noGrp="1" noRot="1" noChangeAspect="1" noMove="1" noResize="1" noEditPoints="1" noAdjustHandles="1" noChangeArrowheads="1" noChangeShapeType="1" noTextEdit="1"/>
-          </p:cNvSpPr>
-          <p:nvPr>
-            <p:extLst>
-              <p:ext uri="{386F3935-93C4-4BCD-93E2-E3B085C9AB24}">
-                <p16:designElem xmlns:p16="http://schemas.microsoft.com/office/powerpoint/2015/main" val="1"/>
-              </p:ext>
-            </p:extLst>
-          </p:nvPr>
-        </p:nvSpPr>
-        <p:spPr>
-          <a:xfrm>
-            <a:off x="0" y="0"/>
-            <a:ext cx="6391835" cy="2285999"/>
-          </a:xfrm>
-          <a:prstGeom prst="rect">
-            <a:avLst/>
-          </a:prstGeom>
-          <a:ln>
-            <a:noFill/>
-          </a:ln>
-          <a:effectLst>
-            <a:outerShdw blurRad="596900" dist="304800" dir="7140000" sx="90000" sy="90000" algn="t" rotWithShape="0">
-              <a:srgbClr val="000000">
-                <a:alpha val="15000"/>
-              </a:srgbClr>
-            </a:outerShdw>
-          </a:effectLst>
-        </p:spPr>
-        <p:style>
-          <a:lnRef idx="2">
-            <a:schemeClr val="accent1">
-              <a:shade val="50000"/>
-            </a:schemeClr>
-          </a:lnRef>
-          <a:fillRef idx="1">
-            <a:schemeClr val="accent1"/>
-          </a:fillRef>
-          <a:effectRef idx="0">
-            <a:schemeClr val="accent1"/>
-          </a:effectRef>
-          <a:fontRef idx="minor">
-            <a:schemeClr val="lt1"/>
-          </a:fontRef>
-        </p:style>
-        <p:txBody>
-          <a:bodyPr rtlCol="0" anchor="ctr"/>
-          <a:lstStyle/>
-          <a:p>
-            <a:pPr algn="ctr"/>
-            <a:endParaRPr lang="en-US"/>
-          </a:p>
-        </p:txBody>
-      </p:sp>
-      <p:sp>
-        <p:nvSpPr>
-          <p:cNvPr id="2" name="Title 1"/>
-          <p:cNvSpPr>
-            <a:spLocks noGrp="1"/>
-          </p:cNvSpPr>
-          <p:nvPr>
-            <p:ph type="title"/>
-          </p:nvPr>
-        </p:nvSpPr>
-        <p:spPr>
-          <a:xfrm>
-            <a:off x="571352" y="350196"/>
-            <a:ext cx="3485178" cy="1624520"/>
-          </a:xfrm>
-        </p:spPr>
-        <p:txBody>
-          <a:bodyPr anchor="ctr">
-            <a:normAutofit fontScale="90000"/>
-          </a:bodyPr>
-          <a:lstStyle/>
-          <a:p>
-            <a:r>
-              <a:rPr lang="en-US" sz="3500" dirty="0"/>
-              <a:t>Samuel's Checkers Program (1952)</a:t>
-            </a:r>
-          </a:p>
-        </p:txBody>
-      </p:sp>
-      <p:sp>
-        <p:nvSpPr>
-          <p:cNvPr id="3" name="Content Placeholder 2"/>
-          <p:cNvSpPr>
-            <a:spLocks noGrp="1"/>
-          </p:cNvSpPr>
-          <p:nvPr>
-            <p:ph idx="1"/>
-          </p:nvPr>
-        </p:nvSpPr>
-        <p:spPr>
-          <a:xfrm>
-            <a:off x="294199" y="2743200"/>
-            <a:ext cx="3762332" cy="3613149"/>
-          </a:xfrm>
-        </p:spPr>
-        <p:txBody>
-          <a:bodyPr anchor="ctr">
-            <a:noAutofit/>
-          </a:bodyPr>
-          <a:lstStyle/>
-          <a:p>
-            <a:r>
-              <a:rPr lang="en-US" sz="2400" dirty="0">
-                <a:hlinkClick r:id="rId3"/>
-              </a:rPr>
-              <a:t>One of the first self-learning programs</a:t>
-            </a:r>
-            <a:endParaRPr lang="en-US" sz="2400" dirty="0"/>
-          </a:p>
-          <a:p>
-            <a:pPr lvl="1"/>
-            <a:r>
-              <a:rPr lang="en-US" sz="2400" dirty="0"/>
-              <a:t>Arthur Samuel (1952)</a:t>
-            </a:r>
-          </a:p>
-          <a:p>
-            <a:pPr lvl="1"/>
-            <a:r>
-              <a:rPr lang="en-US" sz="2400" dirty="0"/>
-              <a:t>Used heuristic search and reinforcement learning</a:t>
-            </a:r>
-          </a:p>
-          <a:p>
-            <a:pPr lvl="1"/>
-            <a:r>
-              <a:rPr lang="en-US" sz="2400" dirty="0"/>
-              <a:t>Could beat a human player</a:t>
-            </a:r>
-          </a:p>
-        </p:txBody>
-      </p:sp>
-      <p:pic>
-        <p:nvPicPr>
-          <p:cNvPr id="5" name="Picture 4" descr="Light bulb on yellow background with sketched light beams and cord">
-            <a:extLst>
-              <a:ext uri="{FF2B5EF4-FFF2-40B4-BE49-F238E27FC236}">
-                <a16:creationId xmlns:a16="http://schemas.microsoft.com/office/drawing/2014/main" id="{8CA635AF-CE40-56CB-7898-F7A7B50F7331}"/>
-              </a:ext>
-            </a:extLst>
-          </p:cNvPr>
-          <p:cNvPicPr>
-            <a:picLocks noChangeAspect="1"/>
-          </p:cNvPicPr>
-          <p:nvPr/>
-        </p:nvPicPr>
-        <p:blipFill rotWithShape="1">
-          <a:blip r:embed="rId4"/>
-          <a:srcRect l="51606" r="7348"/>
-          <a:stretch/>
-        </p:blipFill>
-        <p:spPr>
-          <a:xfrm>
-            <a:off x="4572000" y="1"/>
-            <a:ext cx="4577118" cy="6858000"/>
-          </a:xfrm>
-          <a:prstGeom prst="rect">
-            <a:avLst/>
-          </a:prstGeom>
-        </p:spPr>
-      </p:pic>
+        </p:grpSpPr>
+        <p:sp>
+          <p:nvSpPr>
+            <p:cNvPr id="3080" name="Rectangle 3079">
+              <a:extLst>
+                <a:ext uri="{FF2B5EF4-FFF2-40B4-BE49-F238E27FC236}">
+                  <a16:creationId xmlns:a16="http://schemas.microsoft.com/office/drawing/2014/main" id="{10B4520A-996E-330C-99DA-69CA4D89E906}"/>
+                </a:ext>
+                <a:ext uri="{C183D7F6-B498-43B3-948B-1728B52AA6E4}">
+                  <adec:decorative xmlns:adec="http://schemas.microsoft.com/office/drawing/2017/decorative" val="1"/>
+                </a:ext>
+              </a:extLst>
+            </p:cNvPr>
+            <p:cNvSpPr/>
+            <p:nvPr>
+              <p:extLst>
+                <p:ext uri="{386F3935-93C4-4BCD-93E2-E3B085C9AB24}">
+                  <p16:designElem xmlns:p16="http://schemas.microsoft.com/office/powerpoint/2015/main" val="1"/>
+                </p:ext>
+              </p:extLst>
+            </p:nvPr>
+          </p:nvSpPr>
+          <p:spPr>
+            <a:xfrm>
+              <a:off x="12068638" y="0"/>
+              <a:ext cx="123362" cy="6858000"/>
+            </a:xfrm>
+            <a:prstGeom prst="rect">
+              <a:avLst/>
+            </a:prstGeom>
+            <a:gradFill>
+              <a:gsLst>
+                <a:gs pos="0">
+                  <a:schemeClr val="accent2"/>
+                </a:gs>
+                <a:gs pos="100000">
+                  <a:schemeClr val="accent5"/>
+                </a:gs>
+              </a:gsLst>
+              <a:lin ang="1800000" scaled="0"/>
+            </a:gradFill>
+            <a:ln>
+              <a:noFill/>
+            </a:ln>
+          </p:spPr>
+          <p:style>
+            <a:lnRef idx="2">
+              <a:schemeClr val="accent1">
+                <a:shade val="50000"/>
+              </a:schemeClr>
+            </a:lnRef>
+            <a:fillRef idx="1">
+              <a:schemeClr val="accent1"/>
+            </a:fillRef>
+            <a:effectRef idx="0">
+              <a:schemeClr val="accent1"/>
+            </a:effectRef>
+            <a:fontRef idx="minor">
+              <a:schemeClr val="lt1"/>
+            </a:fontRef>
+          </p:style>
+          <p:txBody>
+            <a:bodyPr rtlCol="0" anchor="ctr"/>
+            <a:lstStyle/>
+            <a:p>
+              <a:pPr algn="ctr"/>
+              <a:endParaRPr lang="en-US"/>
+            </a:p>
+          </p:txBody>
+        </p:sp>
+        <p:sp>
+          <p:nvSpPr>
+            <p:cNvPr id="3081" name="Rectangle 3080">
+              <a:extLst>
+                <a:ext uri="{FF2B5EF4-FFF2-40B4-BE49-F238E27FC236}">
+                  <a16:creationId xmlns:a16="http://schemas.microsoft.com/office/drawing/2014/main" id="{EC8FA945-E356-695F-18D6-CAD4EF34FE4A}"/>
+                </a:ext>
+                <a:ext uri="{C183D7F6-B498-43B3-948B-1728B52AA6E4}">
+                  <adec:decorative xmlns:adec="http://schemas.microsoft.com/office/drawing/2017/decorative" val="1"/>
+                </a:ext>
+              </a:extLst>
+            </p:cNvPr>
+            <p:cNvSpPr/>
+            <p:nvPr>
+              <p:extLst>
+                <p:ext uri="{386F3935-93C4-4BCD-93E2-E3B085C9AB24}">
+                  <p16:designElem xmlns:p16="http://schemas.microsoft.com/office/powerpoint/2015/main" val="1"/>
+                </p:ext>
+              </p:extLst>
+            </p:nvPr>
+          </p:nvSpPr>
+          <p:spPr>
+            <a:xfrm>
+              <a:off x="12068638" y="3527553"/>
+              <a:ext cx="123362" cy="3330447"/>
+            </a:xfrm>
+            <a:prstGeom prst="rect">
+              <a:avLst/>
+            </a:prstGeom>
+            <a:gradFill>
+              <a:gsLst>
+                <a:gs pos="19000">
+                  <a:schemeClr val="accent5">
+                    <a:lumMod val="60000"/>
+                    <a:lumOff val="40000"/>
+                    <a:alpha val="0"/>
+                  </a:schemeClr>
+                </a:gs>
+                <a:gs pos="100000">
+                  <a:schemeClr val="accent5">
+                    <a:lumMod val="60000"/>
+                    <a:lumOff val="40000"/>
+                  </a:schemeClr>
+                </a:gs>
+              </a:gsLst>
+              <a:lin ang="600000" scaled="0"/>
+            </a:gradFill>
+            <a:ln>
+              <a:noFill/>
+            </a:ln>
+          </p:spPr>
+          <p:style>
+            <a:lnRef idx="2">
+              <a:schemeClr val="accent1">
+                <a:shade val="50000"/>
+              </a:schemeClr>
+            </a:lnRef>
+            <a:fillRef idx="1">
+              <a:schemeClr val="accent1"/>
+            </a:fillRef>
+            <a:effectRef idx="0">
+              <a:schemeClr val="accent1"/>
+            </a:effectRef>
+            <a:fontRef idx="minor">
+              <a:schemeClr val="lt1"/>
+            </a:fontRef>
+          </p:style>
+          <p:txBody>
+            <a:bodyPr rtlCol="0" anchor="ctr"/>
+            <a:lstStyle/>
+            <a:p>
+              <a:pPr algn="ctr"/>
+              <a:endParaRPr lang="en-US"/>
+            </a:p>
+          </p:txBody>
+        </p:sp>
+      </p:grpSp>
     </p:spTree>
   </p:cSld>
   <p:clrMapOvr>
@@ -10249,21 +10712,180 @@
           <a:chExt cx="0" cy="0"/>
         </a:xfrm>
       </p:grpSpPr>
-      <p:sp useBgFill="1">
-        <p:nvSpPr>
-          <p:cNvPr id="16" name="Slide Background">
+      <p:sp>
+        <p:nvSpPr>
+          <p:cNvPr id="2" name="Title 1"/>
+          <p:cNvSpPr>
+            <a:spLocks noGrp="1"/>
+          </p:cNvSpPr>
+          <p:nvPr>
+            <p:ph type="title"/>
+          </p:nvPr>
+        </p:nvSpPr>
+        <p:spPr>
+          <a:xfrm>
+            <a:off x="630173" y="480841"/>
+            <a:ext cx="2591866" cy="1616203"/>
+          </a:xfrm>
+        </p:spPr>
+        <p:txBody>
+          <a:bodyPr anchor="b">
+            <a:normAutofit/>
+          </a:bodyPr>
+          <a:lstStyle/>
+          <a:p>
+            <a:r>
+              <a:rPr lang="en-US" sz="2800" dirty="0"/>
+              <a:t>Advancements in Computing Power</a:t>
+            </a:r>
+          </a:p>
+        </p:txBody>
+      </p:sp>
+      <p:sp>
+        <p:nvSpPr>
+          <p:cNvPr id="3" name="Content Placeholder 2"/>
+          <p:cNvSpPr>
+            <a:spLocks noGrp="1"/>
+          </p:cNvSpPr>
+          <p:nvPr>
+            <p:ph idx="1"/>
+          </p:nvPr>
+        </p:nvSpPr>
+        <p:spPr>
+          <a:xfrm>
+            <a:off x="55729" y="2383847"/>
+            <a:ext cx="3740754" cy="3447832"/>
+          </a:xfrm>
+        </p:spPr>
+        <p:txBody>
+          <a:bodyPr anchor="t">
+            <a:noAutofit/>
+          </a:bodyPr>
+          <a:lstStyle/>
+          <a:p>
+            <a:pPr>
+              <a:lnSpc>
+                <a:spcPct val="90000"/>
+              </a:lnSpc>
+            </a:pPr>
+            <a:r>
+              <a:rPr lang="en-US" sz="2400" dirty="0">
+                <a:hlinkClick r:id="rId3"/>
+              </a:rPr>
+              <a:t>Moore's Law</a:t>
+            </a:r>
+            <a:r>
+              <a:rPr lang="en-US" sz="2400" dirty="0"/>
+              <a:t>: Doubling of transistors on integrated circuits approximately every two years</a:t>
+            </a:r>
+          </a:p>
+          <a:p>
+            <a:pPr>
+              <a:lnSpc>
+                <a:spcPct val="90000"/>
+              </a:lnSpc>
+            </a:pPr>
+            <a:r>
+              <a:rPr lang="en-US" sz="2400" dirty="0"/>
+              <a:t>Increased computational capacity</a:t>
+            </a:r>
+          </a:p>
+          <a:p>
+            <a:pPr>
+              <a:lnSpc>
+                <a:spcPct val="90000"/>
+              </a:lnSpc>
+            </a:pPr>
+            <a:r>
+              <a:rPr lang="en-US" sz="2400" dirty="0"/>
+              <a:t>Role of GPUs and specialized hardware:</a:t>
+            </a:r>
+          </a:p>
+          <a:p>
+            <a:pPr lvl="1">
+              <a:lnSpc>
+                <a:spcPct val="90000"/>
+              </a:lnSpc>
+            </a:pPr>
+            <a:r>
+              <a:rPr lang="en-US" sz="2400" dirty="0"/>
+              <a:t>NVIDIA's CUDA (2006)</a:t>
+            </a:r>
+          </a:p>
+          <a:p>
+            <a:pPr lvl="1">
+              <a:lnSpc>
+                <a:spcPct val="90000"/>
+              </a:lnSpc>
+            </a:pPr>
+            <a:r>
+              <a:rPr lang="en-US" sz="2400" dirty="0"/>
+              <a:t>Tensor Processing Units (TPUs) by Google</a:t>
+            </a:r>
+          </a:p>
+        </p:txBody>
+      </p:sp>
+      <p:pic>
+        <p:nvPicPr>
+          <p:cNvPr id="4098" name="Picture 2" descr="refer to caption">
             <a:extLst>
               <a:ext uri="{FF2B5EF4-FFF2-40B4-BE49-F238E27FC236}">
-                <a16:creationId xmlns:a16="http://schemas.microsoft.com/office/drawing/2014/main" id="{9F7D5CDA-D291-4307-BF55-1381FED29634}"/>
+                <a16:creationId xmlns:a16="http://schemas.microsoft.com/office/drawing/2014/main" id="{B68D07B7-BE10-2AE2-39B6-B0748DE13B71}"/>
+              </a:ext>
+            </a:extLst>
+          </p:cNvPr>
+          <p:cNvPicPr>
+            <a:picLocks noChangeAspect="1" noChangeArrowheads="1"/>
+          </p:cNvPicPr>
+          <p:nvPr/>
+        </p:nvPicPr>
+        <p:blipFill>
+          <a:blip r:embed="rId4">
+            <a:extLst>
+              <a:ext uri="{28A0092B-C50C-407E-A947-70E740481C1C}">
+                <a14:useLocalDpi xmlns:a14="http://schemas.microsoft.com/office/drawing/2010/main" val="0"/>
+              </a:ext>
+            </a:extLst>
+          </a:blip>
+          <a:stretch>
+            <a:fillRect/>
+          </a:stretch>
+        </p:blipFill>
+        <p:spPr bwMode="auto">
+          <a:xfrm>
+            <a:off x="3740754" y="1660612"/>
+            <a:ext cx="4792009" cy="3546086"/>
+          </a:xfrm>
+          <a:prstGeom prst="rect">
+            <a:avLst/>
+          </a:prstGeom>
+          <a:noFill/>
+          <a:extLst>
+            <a:ext uri="{909E8E84-426E-40DD-AFC4-6F175D3DCCD1}">
+              <a14:hiddenFill xmlns:a14="http://schemas.microsoft.com/office/drawing/2010/main">
+                <a:solidFill>
+                  <a:srgbClr val="FFFFFF"/>
+                </a:solidFill>
+              </a14:hiddenFill>
+            </a:ext>
+          </a:extLst>
+        </p:spPr>
+      </p:pic>
+      <p:grpSp>
+        <p:nvGrpSpPr>
+          <p:cNvPr id="4103" name="Group 4102">
+            <a:extLst>
+              <a:ext uri="{FF2B5EF4-FFF2-40B4-BE49-F238E27FC236}">
+                <a16:creationId xmlns:a16="http://schemas.microsoft.com/office/drawing/2014/main" id="{6258F736-B256-8039-9DC6-F4E49A5C5AD5}"/>
               </a:ext>
               <a:ext uri="{C183D7F6-B498-43B3-948B-1728B52AA6E4}">
                 <adec:decorative xmlns:adec="http://schemas.microsoft.com/office/drawing/2017/decorative" val="1"/>
               </a:ext>
             </a:extLst>
           </p:cNvPr>
-          <p:cNvSpPr>
-            <a:spLocks noGrp="1" noRot="1" noChangeAspect="1" noMove="1" noResize="1" noEditPoints="1" noAdjustHandles="1" noChangeArrowheads="1" noChangeShapeType="1" noTextEdit="1"/>
-          </p:cNvSpPr>
+          <p:cNvGrpSpPr>
+            <a:grpSpLocks noGrp="1" noUngrp="1" noRot="1" noChangeAspect="1" noMove="1" noResize="1"/>
+          </p:cNvGrpSpPr>
           <p:nvPr>
             <p:extLst>
               <p:ext uri="{386F3935-93C4-4BCD-93E2-E3B085C9AB24}">
@@ -10271,170 +10893,161 @@
               </p:ext>
             </p:extLst>
           </p:nvPr>
-        </p:nvSpPr>
-        <p:spPr>
-          <a:xfrm>
-            <a:off x="0" y="0"/>
-            <a:ext cx="9144000" cy="6858000"/>
+        </p:nvGrpSpPr>
+        <p:grpSpPr>
+          <a:xfrm flipH="1">
+            <a:off x="9051478" y="0"/>
+            <a:ext cx="92522" cy="6858000"/>
+            <a:chOff x="12068638" y="0"/>
+            <a:chExt cx="123362" cy="6858000"/>
           </a:xfrm>
-          <a:prstGeom prst="rect">
-            <a:avLst/>
-          </a:prstGeom>
-          <a:ln>
-            <a:noFill/>
-          </a:ln>
-        </p:spPr>
-        <p:style>
-          <a:lnRef idx="2">
-            <a:schemeClr val="accent1">
-              <a:shade val="50000"/>
-            </a:schemeClr>
-          </a:lnRef>
-          <a:fillRef idx="1">
-            <a:schemeClr val="accent1"/>
-          </a:fillRef>
-          <a:effectRef idx="0">
-            <a:schemeClr val="accent1"/>
-          </a:effectRef>
-          <a:fontRef idx="minor">
-            <a:schemeClr val="lt1"/>
-          </a:fontRef>
-        </p:style>
-        <p:txBody>
-          <a:bodyPr rtlCol="0" anchor="ctr"/>
-          <a:lstStyle/>
-          <a:p>
-            <a:pPr algn="ctr"/>
-            <a:endParaRPr lang="en-US"/>
-          </a:p>
-        </p:txBody>
-      </p:sp>
-      <p:sp>
-        <p:nvSpPr>
-          <p:cNvPr id="2" name="Title 1"/>
-          <p:cNvSpPr>
-            <a:spLocks noGrp="1"/>
-          </p:cNvSpPr>
-          <p:nvPr>
-            <p:ph type="title"/>
-          </p:nvPr>
-        </p:nvSpPr>
-        <p:spPr>
-          <a:xfrm>
-            <a:off x="571349" y="292874"/>
-            <a:ext cx="4000647" cy="1708242"/>
-          </a:xfrm>
-        </p:spPr>
-        <p:txBody>
-          <a:bodyPr anchor="ctr">
-            <a:normAutofit/>
-          </a:bodyPr>
-          <a:lstStyle/>
-          <a:p>
-            <a:r>
-              <a:rPr lang="en-US" sz="3500" dirty="0"/>
-              <a:t>Advancements in Computing Power</a:t>
-            </a:r>
-          </a:p>
-        </p:txBody>
-      </p:sp>
-      <p:sp>
-        <p:nvSpPr>
-          <p:cNvPr id="3" name="Content Placeholder 2"/>
-          <p:cNvSpPr>
-            <a:spLocks noGrp="1"/>
-          </p:cNvSpPr>
-          <p:nvPr>
-            <p:ph idx="1"/>
-          </p:nvPr>
-        </p:nvSpPr>
-        <p:spPr>
-          <a:xfrm>
-            <a:off x="198783" y="2470244"/>
-            <a:ext cx="4723073" cy="3769835"/>
-          </a:xfrm>
-        </p:spPr>
-        <p:txBody>
-          <a:bodyPr anchor="ctr">
-            <a:noAutofit/>
-          </a:bodyPr>
-          <a:lstStyle/>
-          <a:p>
-            <a:r>
-              <a:rPr lang="en-US" sz="2400" dirty="0">
-                <a:hlinkClick r:id="rId3"/>
-              </a:rPr>
-              <a:t>Moore's Law</a:t>
-            </a:r>
-            <a:r>
-              <a:rPr lang="en-US" sz="2400" dirty="0"/>
-              <a:t>: Doubling of transistors on integrated circuits approximately every two years</a:t>
-            </a:r>
-          </a:p>
-          <a:p>
-            <a:r>
-              <a:rPr lang="en-US" sz="2400" dirty="0"/>
-              <a:t>Increased computational capacity</a:t>
-            </a:r>
-          </a:p>
-          <a:p>
-            <a:r>
-              <a:rPr lang="en-US" sz="2400" dirty="0"/>
-              <a:t>Role of GPUs and specialized hardware:</a:t>
-            </a:r>
-          </a:p>
-          <a:p>
-            <a:pPr lvl="1"/>
-            <a:r>
-              <a:rPr lang="en-US" sz="2400" dirty="0"/>
-              <a:t>NVIDIA's CUDA (2006)</a:t>
-            </a:r>
-          </a:p>
-          <a:p>
-            <a:pPr lvl="1"/>
-            <a:r>
-              <a:rPr lang="en-US" sz="2400" dirty="0"/>
-              <a:t>Tensor Processing Units (TPUs) by Google</a:t>
-            </a:r>
-          </a:p>
-        </p:txBody>
-      </p:sp>
-      <p:pic>
-        <p:nvPicPr>
-          <p:cNvPr id="5" name="Picture 4" descr="Electronics protoboard">
-            <a:extLst>
-              <a:ext uri="{FF2B5EF4-FFF2-40B4-BE49-F238E27FC236}">
-                <a16:creationId xmlns:a16="http://schemas.microsoft.com/office/drawing/2014/main" id="{D262C67D-AE44-7228-F12F-B59F84BBC133}"/>
-              </a:ext>
-            </a:extLst>
-          </p:cNvPr>
-          <p:cNvPicPr>
-            <a:picLocks noChangeAspect="1"/>
-          </p:cNvPicPr>
-          <p:nvPr/>
-        </p:nvPicPr>
-        <p:blipFill rotWithShape="1">
-          <a:blip r:embed="rId4"/>
-          <a:srcRect l="13172" r="47951" b="-1"/>
-          <a:stretch/>
-        </p:blipFill>
-        <p:spPr>
-          <a:xfrm>
-            <a:off x="5143347" y="-10886"/>
-            <a:ext cx="4000653" cy="6868886"/>
-          </a:xfrm>
-          <a:prstGeom prst="rect">
-            <a:avLst/>
-          </a:prstGeom>
-          <a:effectLst>
-            <a:outerShdw blurRad="127000" dist="50800" dir="10800000" sx="99000" sy="99000" algn="r" rotWithShape="0">
-              <a:prstClr val="black">
-                <a:alpha val="40000"/>
-              </a:prstClr>
-            </a:outerShdw>
-          </a:effectLst>
-        </p:spPr>
-      </p:pic>
+        </p:grpSpPr>
+        <p:sp>
+          <p:nvSpPr>
+            <p:cNvPr id="4104" name="Rectangle 4103">
+              <a:extLst>
+                <a:ext uri="{FF2B5EF4-FFF2-40B4-BE49-F238E27FC236}">
+                  <a16:creationId xmlns:a16="http://schemas.microsoft.com/office/drawing/2014/main" id="{10B4520A-996E-330C-99DA-69CA4D89E906}"/>
+                </a:ext>
+                <a:ext uri="{C183D7F6-B498-43B3-948B-1728B52AA6E4}">
+                  <adec:decorative xmlns:adec="http://schemas.microsoft.com/office/drawing/2017/decorative" val="1"/>
+                </a:ext>
+              </a:extLst>
+            </p:cNvPr>
+            <p:cNvSpPr/>
+            <p:nvPr>
+              <p:extLst>
+                <p:ext uri="{386F3935-93C4-4BCD-93E2-E3B085C9AB24}">
+                  <p16:designElem xmlns:p16="http://schemas.microsoft.com/office/powerpoint/2015/main" val="1"/>
+                </p:ext>
+              </p:extLst>
+            </p:nvPr>
+          </p:nvSpPr>
+          <p:spPr>
+            <a:xfrm>
+              <a:off x="12068638" y="0"/>
+              <a:ext cx="123362" cy="6858000"/>
+            </a:xfrm>
+            <a:prstGeom prst="rect">
+              <a:avLst/>
+            </a:prstGeom>
+            <a:gradFill>
+              <a:gsLst>
+                <a:gs pos="0">
+                  <a:schemeClr val="accent2"/>
+                </a:gs>
+                <a:gs pos="100000">
+                  <a:schemeClr val="accent5"/>
+                </a:gs>
+              </a:gsLst>
+              <a:lin ang="1800000" scaled="0"/>
+            </a:gradFill>
+            <a:ln>
+              <a:noFill/>
+            </a:ln>
+          </p:spPr>
+          <p:style>
+            <a:lnRef idx="2">
+              <a:schemeClr val="accent1">
+                <a:shade val="50000"/>
+              </a:schemeClr>
+            </a:lnRef>
+            <a:fillRef idx="1">
+              <a:schemeClr val="accent1"/>
+            </a:fillRef>
+            <a:effectRef idx="0">
+              <a:schemeClr val="accent1"/>
+            </a:effectRef>
+            <a:fontRef idx="minor">
+              <a:schemeClr val="lt1"/>
+            </a:fontRef>
+          </p:style>
+          <p:txBody>
+            <a:bodyPr rtlCol="0" anchor="ctr"/>
+            <a:lstStyle/>
+            <a:p>
+              <a:pPr algn="ctr"/>
+              <a:endParaRPr lang="en-US"/>
+            </a:p>
+          </p:txBody>
+        </p:sp>
+        <p:sp>
+          <p:nvSpPr>
+            <p:cNvPr id="4105" name="Rectangle 4104">
+              <a:extLst>
+                <a:ext uri="{FF2B5EF4-FFF2-40B4-BE49-F238E27FC236}">
+                  <a16:creationId xmlns:a16="http://schemas.microsoft.com/office/drawing/2014/main" id="{EC8FA945-E356-695F-18D6-CAD4EF34FE4A}"/>
+                </a:ext>
+                <a:ext uri="{C183D7F6-B498-43B3-948B-1728B52AA6E4}">
+                  <adec:decorative xmlns:adec="http://schemas.microsoft.com/office/drawing/2017/decorative" val="1"/>
+                </a:ext>
+              </a:extLst>
+            </p:cNvPr>
+            <p:cNvSpPr/>
+            <p:nvPr>
+              <p:extLst>
+                <p:ext uri="{386F3935-93C4-4BCD-93E2-E3B085C9AB24}">
+                  <p16:designElem xmlns:p16="http://schemas.microsoft.com/office/powerpoint/2015/main" val="1"/>
+                </p:ext>
+              </p:extLst>
+            </p:nvPr>
+          </p:nvSpPr>
+          <p:spPr>
+            <a:xfrm>
+              <a:off x="12068638" y="3527553"/>
+              <a:ext cx="123362" cy="3330447"/>
+            </a:xfrm>
+            <a:prstGeom prst="rect">
+              <a:avLst/>
+            </a:prstGeom>
+            <a:gradFill>
+              <a:gsLst>
+                <a:gs pos="19000">
+                  <a:schemeClr val="accent5">
+                    <a:lumMod val="60000"/>
+                    <a:lumOff val="40000"/>
+                    <a:alpha val="0"/>
+                  </a:schemeClr>
+                </a:gs>
+                <a:gs pos="100000">
+                  <a:schemeClr val="accent5">
+                    <a:lumMod val="60000"/>
+                    <a:lumOff val="40000"/>
+                  </a:schemeClr>
+                </a:gs>
+              </a:gsLst>
+              <a:lin ang="600000" scaled="0"/>
+            </a:gradFill>
+            <a:ln>
+              <a:noFill/>
+            </a:ln>
+          </p:spPr>
+          <p:style>
+            <a:lnRef idx="2">
+              <a:schemeClr val="accent1">
+                <a:shade val="50000"/>
+              </a:schemeClr>
+            </a:lnRef>
+            <a:fillRef idx="1">
+              <a:schemeClr val="accent1"/>
+            </a:fillRef>
+            <a:effectRef idx="0">
+              <a:schemeClr val="accent1"/>
+            </a:effectRef>
+            <a:fontRef idx="minor">
+              <a:schemeClr val="lt1"/>
+            </a:fontRef>
+          </p:style>
+          <p:txBody>
+            <a:bodyPr rtlCol="0" anchor="ctr"/>
+            <a:lstStyle/>
+            <a:p>
+              <a:pPr algn="ctr"/>
+              <a:endParaRPr lang="en-US"/>
+            </a:p>
+          </p:txBody>
+        </p:sp>
+      </p:grpSp>
     </p:spTree>
   </p:cSld>
   <p:clrMapOvr>

</xml_diff>